<commit_message>
pagina quem somos conclída
</commit_message>
<xml_diff>
--- a/Documentação/Diagrama de Solução de Software/Diagrama de Solução de Software v1.pptx
+++ b/Documentação/Diagrama de Solução de Software/Diagrama de Solução de Software v1.pptx
@@ -133,12 +133,33 @@
 </p:presentation>
 </file>
 
-<file path=ppt/revisionInfo.xml><?xml version="1.0" encoding="utf-8"?>
-<p1510:revInfo xmlns:a="http://schemas.openxmlformats.org/drawingml/2006/main" xmlns:r="http://schemas.openxmlformats.org/officeDocument/2006/relationships" xmlns:p1510="http://schemas.microsoft.com/office/powerpoint/2015/10/main">
-  <p1510:revLst>
-    <p1510:client id="{F85A101C-0A15-4F5C-819A-4CDC78E1BE13}" v="1" dt="2021-09-21T16:44:11.292"/>
-  </p1510:revLst>
-</p1510:revInfo>
+<file path=ppt/changesInfos/changesInfo1.xml><?xml version="1.0" encoding="utf-8"?>
+<pc:chgInfo xmlns:a="http://schemas.openxmlformats.org/drawingml/2006/main" xmlns:r="http://schemas.openxmlformats.org/officeDocument/2006/relationships" xmlns:ac="http://schemas.microsoft.com/office/drawing/2013/main/command" xmlns:pc="http://schemas.microsoft.com/office/powerpoint/2013/main/command">
+  <pc:docChgLst>
+    <pc:chgData name="Vinicius Cano" userId="e988c080-1d50-4980-86fe-45a1167ad471" providerId="ADAL" clId="{480DBBF9-4B14-4839-BDB8-5DED642FCB5E}"/>
+    <pc:docChg chg="modSld">
+      <pc:chgData name="Vinicius Cano" userId="e988c080-1d50-4980-86fe-45a1167ad471" providerId="ADAL" clId="{480DBBF9-4B14-4839-BDB8-5DED642FCB5E}" dt="2021-10-05T19:43:34.440" v="1" actId="20577"/>
+      <pc:docMkLst>
+        <pc:docMk/>
+      </pc:docMkLst>
+      <pc:sldChg chg="modSp mod">
+        <pc:chgData name="Vinicius Cano" userId="e988c080-1d50-4980-86fe-45a1167ad471" providerId="ADAL" clId="{480DBBF9-4B14-4839-BDB8-5DED642FCB5E}" dt="2021-10-05T19:43:34.440" v="1" actId="20577"/>
+        <pc:sldMkLst>
+          <pc:docMk/>
+          <pc:sldMk cId="2659641936" sldId="901"/>
+        </pc:sldMkLst>
+        <pc:spChg chg="mod">
+          <ac:chgData name="Vinicius Cano" userId="e988c080-1d50-4980-86fe-45a1167ad471" providerId="ADAL" clId="{480DBBF9-4B14-4839-BDB8-5DED642FCB5E}" dt="2021-10-05T19:43:34.440" v="1" actId="20577"/>
+          <ac:spMkLst>
+            <pc:docMk/>
+            <pc:sldMk cId="2659641936" sldId="901"/>
+            <ac:spMk id="21" creationId="{78BB133B-A09F-4737-9A17-E0094183B19D}"/>
+          </ac:spMkLst>
+        </pc:spChg>
+      </pc:sldChg>
+    </pc:docChg>
+  </pc:docChgLst>
+</pc:chgInfo>
 </file>
 
 <file path=ppt/handoutMasters/handoutMaster1.xml><?xml version="1.0" encoding="utf-8"?>
@@ -224,7 +245,7 @@
             <a:fld id="{C3CD65D1-5C11-455D-9F9A-0E035F00A0DA}" type="datetimeFigureOut">
               <a:rPr lang="pt-BR" smtClean="0"/>
               <a:pPr/>
-              <a:t>23/09/2021</a:t>
+              <a:t>05/10/2021</a:t>
             </a:fld>
             <a:endParaRPr lang="pt-BR"/>
           </a:p>
@@ -392,7 +413,7 @@
             <a:fld id="{A05DA3EF-18EA-43DE-B1BB-402A3C558822}" type="datetimeFigureOut">
               <a:rPr lang="pt-BR" smtClean="0"/>
               <a:pPr/>
-              <a:t>23/09/2021</a:t>
+              <a:t>05/10/2021</a:t>
             </a:fld>
             <a:endParaRPr lang="pt-BR"/>
           </a:p>
@@ -8037,7 +8058,7 @@
           <p:spPr>
             <a:xfrm>
               <a:off x="8741678" y="1583056"/>
-              <a:ext cx="2566458" cy="1138773"/>
+              <a:ext cx="2566458" cy="735044"/>
             </a:xfrm>
             <a:prstGeom prst="rect">
               <a:avLst/>
@@ -8111,26 +8132,18 @@
                 <a:defRPr/>
               </a:pPr>
               <a:r>
-                <a:rPr lang="pt-BR" sz="1600" dirty="0">
+                <a:rPr lang="pt-BR" sz="1600">
                   <a:solidFill>
                     <a:prstClr val="white"/>
                   </a:solidFill>
                 </a:rPr>
                 <a:t>Spring Boot]</a:t>
               </a:r>
-            </a:p>
-            <a:p>
-              <a:pPr lvl="0" algn="ctr">
-                <a:defRPr/>
-              </a:pPr>
-              <a:r>
-                <a:rPr lang="pt-BR" sz="1600" dirty="0">
-                  <a:solidFill>
-                    <a:prstClr val="white"/>
-                  </a:solidFill>
-                </a:rPr>
-                <a:t>]</a:t>
-              </a:r>
+              <a:endParaRPr lang="pt-BR" sz="1600" dirty="0">
+                <a:solidFill>
+                  <a:prstClr val="white"/>
+                </a:solidFill>
+              </a:endParaRPr>
             </a:p>
           </p:txBody>
         </p:sp>
@@ -11004,15 +11017,6 @@
 </file>
 
 <file path=customXml/item2.xml><?xml version="1.0" encoding="utf-8"?>
-<?mso-contentType ?>
-<FormTemplates xmlns="http://schemas.microsoft.com/sharepoint/v3/contenttype/forms">
-  <Display>DocumentLibraryForm</Display>
-  <Edit>DocumentLibraryForm</Edit>
-  <New>DocumentLibraryForm</New>
-</FormTemplates>
-</file>
-
-<file path=customXml/item3.xml><?xml version="1.0" encoding="utf-8"?>
 <ct:contentTypeSchema xmlns:ct="http://schemas.microsoft.com/office/2006/metadata/contentType" xmlns:ma="http://schemas.microsoft.com/office/2006/metadata/properties/metaAttributes" ct:_="" ma:_="" ma:contentTypeName="Document" ma:contentTypeID="0x0101001132905C37EA9847A7207C4BBCCCD8F4" ma:contentTypeVersion="13" ma:contentTypeDescription="Create a new document." ma:contentTypeScope="" ma:versionID="0fa59793b99d27e1e0b856ab72ac2f0d">
   <xsd:schema xmlns:xsd="http://www.w3.org/2001/XMLSchema" xmlns:xs="http://www.w3.org/2001/XMLSchema" xmlns:p="http://schemas.microsoft.com/office/2006/metadata/properties" xmlns:ns3="4327b14a-fe89-488e-9f6d-9658cacf372b" xmlns:ns4="bbcd8c33-6940-4d4c-a587-bbc736ca1e4d" targetNamespace="http://schemas.microsoft.com/office/2006/metadata/properties" ma:root="true" ma:fieldsID="01494effa1b4414faf4d9851fe547c93" ns3:_="" ns4:_="">
     <xsd:import namespace="4327b14a-fe89-488e-9f6d-9658cacf372b"/>
@@ -11235,6 +11239,15 @@
 </ct:contentTypeSchema>
 </file>
 
+<file path=customXml/item3.xml><?xml version="1.0" encoding="utf-8"?>
+<?mso-contentType ?>
+<FormTemplates xmlns="http://schemas.microsoft.com/sharepoint/v3/contenttype/forms">
+  <Display>DocumentLibraryForm</Display>
+  <Edit>DocumentLibraryForm</Edit>
+  <New>DocumentLibraryForm</New>
+</FormTemplates>
+</file>
+
 <file path=customXml/itemProps1.xml><?xml version="1.0" encoding="utf-8"?>
 <ds:datastoreItem xmlns:ds="http://schemas.openxmlformats.org/officeDocument/2006/customXml" ds:itemID="{30D3F7B2-E865-49C4-B6C4-1C3489F322E5}">
   <ds:schemaRefs>
@@ -11253,14 +11266,6 @@
 </file>
 
 <file path=customXml/itemProps2.xml><?xml version="1.0" encoding="utf-8"?>
-<ds:datastoreItem xmlns:ds="http://schemas.openxmlformats.org/officeDocument/2006/customXml" ds:itemID="{B2402960-8EF3-4234-B7C9-25E125FD4CA5}">
-  <ds:schemaRefs>
-    <ds:schemaRef ds:uri="http://schemas.microsoft.com/sharepoint/v3/contenttype/forms"/>
-  </ds:schemaRefs>
-</ds:datastoreItem>
-</file>
-
-<file path=customXml/itemProps3.xml><?xml version="1.0" encoding="utf-8"?>
 <ds:datastoreItem xmlns:ds="http://schemas.openxmlformats.org/officeDocument/2006/customXml" ds:itemID="{5B58B9C8-0155-43AB-B381-4C0241D252D3}">
   <ds:schemaRefs>
     <ds:schemaRef ds:uri="http://schemas.microsoft.com/office/2006/metadata/contentType"/>
@@ -11277,4 +11282,12 @@
     <ds:schemaRef ds:uri="http://schemas.microsoft.com/internal/obd"/>
   </ds:schemaRefs>
 </ds:datastoreItem>
+</file>
+
+<file path=customXml/itemProps3.xml><?xml version="1.0" encoding="utf-8"?>
+<ds:datastoreItem xmlns:ds="http://schemas.openxmlformats.org/officeDocument/2006/customXml" ds:itemID="{B2402960-8EF3-4234-B7C9-25E125FD4CA5}">
+  <ds:schemaRefs>
+    <ds:schemaRef ds:uri="http://schemas.microsoft.com/sharepoint/v3/contenttype/forms"/>
+  </ds:schemaRefs>
+</ds:datastoreItem>
 </file>
</xml_diff>

<commit_message>
add definicao e diagrama arq
</commit_message>
<xml_diff>
--- a/Documentação/Diagrama de Solução de Software/Diagrama de Solução de Software v1.pptx
+++ b/Documentação/Diagrama de Solução de Software/Diagrama de Solução de Software v1.pptx
@@ -159,6 +159,46 @@
       </pc:sldChg>
     </pc:docChg>
   </pc:docChgLst>
+  <pc:docChgLst>
+    <pc:chgData name="Vinicius Cano" userId="e988c080-1d50-4980-86fe-45a1167ad471" providerId="ADAL" clId="{9F829FAC-6815-4ADC-AC17-FB5AE0E0A28C}"/>
+    <pc:docChg chg="custSel modSld">
+      <pc:chgData name="Vinicius Cano" userId="e988c080-1d50-4980-86fe-45a1167ad471" providerId="ADAL" clId="{9F829FAC-6815-4ADC-AC17-FB5AE0E0A28C}" dt="2021-10-19T23:38:27.820" v="13" actId="20577"/>
+      <pc:docMkLst>
+        <pc:docMk/>
+      </pc:docMkLst>
+      <pc:sldChg chg="delSp modSp mod delAnim">
+        <pc:chgData name="Vinicius Cano" userId="e988c080-1d50-4980-86fe-45a1167ad471" providerId="ADAL" clId="{9F829FAC-6815-4ADC-AC17-FB5AE0E0A28C}" dt="2021-10-19T23:38:27.820" v="13" actId="20577"/>
+        <pc:sldMkLst>
+          <pc:docMk/>
+          <pc:sldMk cId="2659641936" sldId="901"/>
+        </pc:sldMkLst>
+        <pc:spChg chg="mod">
+          <ac:chgData name="Vinicius Cano" userId="e988c080-1d50-4980-86fe-45a1167ad471" providerId="ADAL" clId="{9F829FAC-6815-4ADC-AC17-FB5AE0E0A28C}" dt="2021-10-19T23:38:27.820" v="13" actId="20577"/>
+          <ac:spMkLst>
+            <pc:docMk/>
+            <pc:sldMk cId="2659641936" sldId="901"/>
+            <ac:spMk id="21" creationId="{78BB133B-A09F-4737-9A17-E0094183B19D}"/>
+          </ac:spMkLst>
+        </pc:spChg>
+        <pc:grpChg chg="del">
+          <ac:chgData name="Vinicius Cano" userId="e988c080-1d50-4980-86fe-45a1167ad471" providerId="ADAL" clId="{9F829FAC-6815-4ADC-AC17-FB5AE0E0A28C}" dt="2021-10-19T23:38:14.532" v="0" actId="478"/>
+          <ac:grpSpMkLst>
+            <pc:docMk/>
+            <pc:sldMk cId="2659641936" sldId="901"/>
+            <ac:grpSpMk id="80" creationId="{2C0B120C-5055-9C48-8CCB-F549F2BF42E9}"/>
+          </ac:grpSpMkLst>
+        </pc:grpChg>
+        <pc:cxnChg chg="del mod">
+          <ac:chgData name="Vinicius Cano" userId="e988c080-1d50-4980-86fe-45a1167ad471" providerId="ADAL" clId="{9F829FAC-6815-4ADC-AC17-FB5AE0E0A28C}" dt="2021-10-19T23:38:15.544" v="1" actId="478"/>
+          <ac:cxnSpMkLst>
+            <pc:docMk/>
+            <pc:sldMk cId="2659641936" sldId="901"/>
+            <ac:cxnSpMk id="67" creationId="{35322181-E3BD-E946-8D2C-FD1AF8B585B1}"/>
+          </ac:cxnSpMkLst>
+        </pc:cxnChg>
+      </pc:sldChg>
+    </pc:docChg>
+  </pc:docChgLst>
 </pc:chgInfo>
 </file>
 
@@ -245,7 +285,7 @@
             <a:fld id="{C3CD65D1-5C11-455D-9F9A-0E035F00A0DA}" type="datetimeFigureOut">
               <a:rPr lang="pt-BR" smtClean="0"/>
               <a:pPr/>
-              <a:t>05/10/2021</a:t>
+              <a:t>19/10/2021</a:t>
             </a:fld>
             <a:endParaRPr lang="pt-BR"/>
           </a:p>
@@ -413,7 +453,7 @@
             <a:fld id="{A05DA3EF-18EA-43DE-B1BB-402A3C558822}" type="datetimeFigureOut">
               <a:rPr lang="pt-BR" smtClean="0"/>
               <a:pPr/>
-              <a:t>05/10/2021</a:t>
+              <a:t>19/10/2021</a:t>
             </a:fld>
             <a:endParaRPr lang="pt-BR"/>
           </a:p>
@@ -8074,29 +8114,18 @@
                 <a:defRPr/>
               </a:pPr>
               <a:r>
-                <a:rPr lang="pt-BR" sz="2000" b="1" dirty="0">
-                  <a:solidFill>
-                    <a:prstClr val="white"/>
-                  </a:solidFill>
-                </a:rPr>
-                <a:t>Web </a:t>
-              </a:r>
-              <a:r>
                 <a:rPr lang="pt-BR" sz="2000" b="1" dirty="0" err="1">
                   <a:solidFill>
                     <a:prstClr val="white"/>
                   </a:solidFill>
                 </a:rPr>
-                <a:t>Application</a:t>
+                <a:t>Microservice</a:t>
               </a:r>
-              <a:r>
-                <a:rPr lang="pt-BR" sz="2000" b="1" dirty="0">
-                  <a:solidFill>
-                    <a:prstClr val="white"/>
-                  </a:solidFill>
-                </a:rPr>
-                <a:t> </a:t>
-              </a:r>
+              <a:endParaRPr lang="pt-BR" sz="2000" b="1" dirty="0">
+                <a:solidFill>
+                  <a:prstClr val="white"/>
+                </a:solidFill>
+              </a:endParaRPr>
             </a:p>
             <a:p>
               <a:pPr lvl="0" algn="ctr">
@@ -8132,18 +8161,13 @@
                 <a:defRPr/>
               </a:pPr>
               <a:r>
-                <a:rPr lang="pt-BR" sz="1600">
+                <a:rPr lang="pt-BR" sz="1600" dirty="0">
                   <a:solidFill>
                     <a:prstClr val="white"/>
                   </a:solidFill>
                 </a:rPr>
                 <a:t>Spring Boot]</a:t>
               </a:r>
-              <a:endParaRPr lang="pt-BR" sz="1600" dirty="0">
-                <a:solidFill>
-                  <a:prstClr val="white"/>
-                </a:solidFill>
-              </a:endParaRPr>
             </a:p>
           </p:txBody>
         </p:sp>
@@ -8587,293 +8611,6 @@
           </p:txBody>
         </p:sp>
       </p:grpSp>
-      <p:grpSp>
-        <p:nvGrpSpPr>
-          <p:cNvPr id="80" name="Group 79">
-            <a:extLst>
-              <a:ext uri="{FF2B5EF4-FFF2-40B4-BE49-F238E27FC236}">
-                <a16:creationId xmlns:a16="http://schemas.microsoft.com/office/drawing/2014/main" id="{2C0B120C-5055-9C48-8CCB-F549F2BF42E9}"/>
-              </a:ext>
-            </a:extLst>
-          </p:cNvPr>
-          <p:cNvGrpSpPr/>
-          <p:nvPr/>
-        </p:nvGrpSpPr>
-        <p:grpSpPr>
-          <a:xfrm>
-            <a:off x="3074897" y="4644726"/>
-            <a:ext cx="2871022" cy="2187536"/>
-            <a:chOff x="3218913" y="4654462"/>
-            <a:chExt cx="2871022" cy="2187536"/>
-          </a:xfrm>
-        </p:grpSpPr>
-        <p:sp>
-          <p:nvSpPr>
-            <p:cNvPr id="7" name="Retângulo 6">
-              <a:extLst>
-                <a:ext uri="{FF2B5EF4-FFF2-40B4-BE49-F238E27FC236}">
-                  <a16:creationId xmlns:a16="http://schemas.microsoft.com/office/drawing/2014/main" id="{A180D8DE-BF4D-4A27-9E30-DEBFF7B84606}"/>
-                </a:ext>
-              </a:extLst>
-            </p:cNvPr>
-            <p:cNvSpPr/>
-            <p:nvPr/>
-          </p:nvSpPr>
-          <p:spPr>
-            <a:xfrm>
-              <a:off x="3218913" y="4654462"/>
-              <a:ext cx="2871022" cy="2187535"/>
-            </a:xfrm>
-            <a:prstGeom prst="rect">
-              <a:avLst/>
-            </a:prstGeom>
-            <a:solidFill>
-              <a:srgbClr val="32B9CD"/>
-            </a:solidFill>
-            <a:ln>
-              <a:solidFill>
-                <a:schemeClr val="accent5">
-                  <a:lumMod val="75000"/>
-                </a:schemeClr>
-              </a:solidFill>
-            </a:ln>
-          </p:spPr>
-          <p:style>
-            <a:lnRef idx="2">
-              <a:schemeClr val="accent1">
-                <a:shade val="50000"/>
-              </a:schemeClr>
-            </a:lnRef>
-            <a:fillRef idx="1">
-              <a:schemeClr val="accent1"/>
-            </a:fillRef>
-            <a:effectRef idx="0">
-              <a:schemeClr val="accent1"/>
-            </a:effectRef>
-            <a:fontRef idx="minor">
-              <a:schemeClr val="lt1"/>
-            </a:fontRef>
-          </p:style>
-          <p:txBody>
-            <a:bodyPr rtlCol="0" anchor="ctr"/>
-            <a:lstStyle/>
-            <a:p>
-              <a:pPr algn="ctr"/>
-              <a:endParaRPr lang="pt-BR" dirty="0">
-                <a:solidFill>
-                  <a:prstClr val="white"/>
-                </a:solidFill>
-                <a:latin typeface="Calibri"/>
-              </a:endParaRPr>
-            </a:p>
-          </p:txBody>
-        </p:sp>
-        <p:sp>
-          <p:nvSpPr>
-            <p:cNvPr id="8" name="Retângulo 7">
-              <a:extLst>
-                <a:ext uri="{FF2B5EF4-FFF2-40B4-BE49-F238E27FC236}">
-                  <a16:creationId xmlns:a16="http://schemas.microsoft.com/office/drawing/2014/main" id="{134A1387-23C1-45FA-9D89-C832D3573B96}"/>
-                </a:ext>
-              </a:extLst>
-            </p:cNvPr>
-            <p:cNvSpPr/>
-            <p:nvPr/>
-          </p:nvSpPr>
-          <p:spPr>
-            <a:xfrm>
-              <a:off x="3506946" y="5518559"/>
-              <a:ext cx="2278425" cy="1323439"/>
-            </a:xfrm>
-            <a:prstGeom prst="rect">
-              <a:avLst/>
-            </a:prstGeom>
-          </p:spPr>
-          <p:txBody>
-            <a:bodyPr wrap="square">
-              <a:spAutoFit/>
-            </a:bodyPr>
-            <a:lstStyle/>
-            <a:p>
-              <a:pPr lvl="0" algn="ctr">
-                <a:defRPr/>
-              </a:pPr>
-              <a:r>
-                <a:rPr lang="pt-BR" sz="1600" b="1" dirty="0">
-                  <a:solidFill>
-                    <a:prstClr val="white"/>
-                  </a:solidFill>
-                </a:rPr>
-                <a:t>Coletor</a:t>
-              </a:r>
-              <a:r>
-                <a:rPr lang="pt-BR" sz="1600" dirty="0">
-                  <a:solidFill>
-                    <a:prstClr val="white"/>
-                  </a:solidFill>
-                </a:rPr>
-                <a:t>  que captura os dados do usuário disponibilizando numa dashboard e Banco de Dados</a:t>
-              </a:r>
-            </a:p>
-          </p:txBody>
-        </p:sp>
-        <p:sp>
-          <p:nvSpPr>
-            <p:cNvPr id="66" name="Retângulo 20">
-              <a:extLst>
-                <a:ext uri="{FF2B5EF4-FFF2-40B4-BE49-F238E27FC236}">
-                  <a16:creationId xmlns:a16="http://schemas.microsoft.com/office/drawing/2014/main" id="{6AA9910F-E6AC-8049-8342-23B35B2B59B8}"/>
-                </a:ext>
-              </a:extLst>
-            </p:cNvPr>
-            <p:cNvSpPr/>
-            <p:nvPr/>
-          </p:nvSpPr>
-          <p:spPr>
-            <a:xfrm>
-              <a:off x="3290921" y="4684864"/>
-              <a:ext cx="2710474" cy="892552"/>
-            </a:xfrm>
-            <a:prstGeom prst="rect">
-              <a:avLst/>
-            </a:prstGeom>
-          </p:spPr>
-          <p:txBody>
-            <a:bodyPr wrap="square">
-              <a:spAutoFit/>
-            </a:bodyPr>
-            <a:lstStyle/>
-            <a:p>
-              <a:pPr lvl="0" algn="ctr">
-                <a:defRPr/>
-              </a:pPr>
-              <a:r>
-                <a:rPr lang="pt-BR" sz="2000" b="1" dirty="0" err="1">
-                  <a:solidFill>
-                    <a:prstClr val="white"/>
-                  </a:solidFill>
-                </a:rPr>
-                <a:t>Client</a:t>
-              </a:r>
-              <a:r>
-                <a:rPr lang="pt-BR" sz="2000" b="1" dirty="0">
-                  <a:solidFill>
-                    <a:prstClr val="white"/>
-                  </a:solidFill>
-                </a:rPr>
-                <a:t> </a:t>
-              </a:r>
-              <a:r>
-                <a:rPr lang="pt-BR" sz="2000" b="1" dirty="0" err="1">
-                  <a:solidFill>
-                    <a:prstClr val="white"/>
-                  </a:solidFill>
-                </a:rPr>
-                <a:t>Side</a:t>
-              </a:r>
-              <a:r>
-                <a:rPr lang="pt-BR" sz="2000" b="1" dirty="0">
-                  <a:solidFill>
-                    <a:prstClr val="white"/>
-                  </a:solidFill>
-                </a:rPr>
-                <a:t> Desktop </a:t>
-              </a:r>
-            </a:p>
-            <a:p>
-              <a:pPr lvl="0" algn="ctr">
-                <a:defRPr/>
-              </a:pPr>
-              <a:r>
-                <a:rPr lang="pt-BR" sz="1600" dirty="0">
-                  <a:solidFill>
-                    <a:prstClr val="white"/>
-                  </a:solidFill>
-                </a:rPr>
-                <a:t>[Container: API </a:t>
-              </a:r>
-              <a:r>
-                <a:rPr lang="pt-BR" sz="1600" dirty="0" err="1">
-                  <a:solidFill>
-                    <a:prstClr val="white"/>
-                  </a:solidFill>
-                </a:rPr>
-                <a:t>Rest</a:t>
-              </a:r>
-              <a:r>
-                <a:rPr lang="pt-BR" sz="1600" dirty="0">
-                  <a:solidFill>
-                    <a:prstClr val="white"/>
-                  </a:solidFill>
-                </a:rPr>
-                <a:t> </a:t>
-              </a:r>
-            </a:p>
-            <a:p>
-              <a:pPr lvl="0" algn="ctr">
-                <a:defRPr/>
-              </a:pPr>
-              <a:r>
-                <a:rPr lang="pt-BR" sz="1600" dirty="0">
-                  <a:solidFill>
-                    <a:prstClr val="white"/>
-                  </a:solidFill>
-                </a:rPr>
-                <a:t>Spring Boot]</a:t>
-              </a:r>
-            </a:p>
-          </p:txBody>
-        </p:sp>
-      </p:grpSp>
-      <p:cxnSp>
-        <p:nvCxnSpPr>
-          <p:cNvPr id="67" name="Conector de Seta Reta 107">
-            <a:extLst>
-              <a:ext uri="{FF2B5EF4-FFF2-40B4-BE49-F238E27FC236}">
-                <a16:creationId xmlns:a16="http://schemas.microsoft.com/office/drawing/2014/main" id="{35322181-E3BD-E946-8D2C-FD1AF8B585B1}"/>
-              </a:ext>
-            </a:extLst>
-          </p:cNvPr>
-          <p:cNvCxnSpPr>
-            <a:cxnSpLocks/>
-            <a:endCxn id="6" idx="3"/>
-          </p:cNvCxnSpPr>
-          <p:nvPr/>
-        </p:nvCxnSpPr>
-        <p:spPr>
-          <a:xfrm flipH="1" flipV="1">
-            <a:off x="4394131" y="3564607"/>
-            <a:ext cx="1" cy="1053177"/>
-          </a:xfrm>
-          <a:prstGeom prst="straightConnector1">
-            <a:avLst/>
-          </a:prstGeom>
-          <a:ln w="19050">
-            <a:solidFill>
-              <a:schemeClr val="accent5">
-                <a:lumMod val="75000"/>
-              </a:schemeClr>
-            </a:solidFill>
-            <a:prstDash val="sysDash"/>
-            <a:headEnd type="none" w="lg" len="lg"/>
-            <a:tailEnd type="triangle" w="lg" len="lg"/>
-          </a:ln>
-        </p:spPr>
-        <p:style>
-          <a:lnRef idx="1">
-            <a:schemeClr val="accent1"/>
-          </a:lnRef>
-          <a:fillRef idx="0">
-            <a:schemeClr val="accent1"/>
-          </a:fillRef>
-          <a:effectRef idx="0">
-            <a:schemeClr val="accent1"/>
-          </a:effectRef>
-          <a:fontRef idx="minor">
-            <a:schemeClr val="tx1"/>
-          </a:fontRef>
-        </p:style>
-      </p:cxnSp>
       <p:grpSp>
         <p:nvGrpSpPr>
           <p:cNvPr id="36" name="Group 35">
@@ -9570,7 +9307,7 @@
                                           </p:stCondLst>
                                         </p:cTn>
                                         <p:tgtEl>
-                                          <p:spTgt spid="80"/>
+                                          <p:spTgt spid="39"/>
                                         </p:tgtEl>
                                         <p:attrNameLst>
                                           <p:attrName>style.visibility</p:attrName>
@@ -9615,7 +9352,7 @@
                                           </p:stCondLst>
                                         </p:cTn>
                                         <p:tgtEl>
-                                          <p:spTgt spid="67"/>
+                                          <p:spTgt spid="108"/>
                                         </p:tgtEl>
                                         <p:attrNameLst>
                                           <p:attrName>style.visibility</p:attrName>
@@ -9660,96 +9397,6 @@
                                           </p:stCondLst>
                                         </p:cTn>
                                         <p:tgtEl>
-                                          <p:spTgt spid="39"/>
-                                        </p:tgtEl>
-                                        <p:attrNameLst>
-                                          <p:attrName>style.visibility</p:attrName>
-                                        </p:attrNameLst>
-                                      </p:cBhvr>
-                                      <p:to>
-                                        <p:strVal val="visible"/>
-                                      </p:to>
-                                    </p:set>
-                                  </p:childTnLst>
-                                </p:cTn>
-                              </p:par>
-                            </p:childTnLst>
-                          </p:cTn>
-                        </p:par>
-                      </p:childTnLst>
-                    </p:cTn>
-                  </p:par>
-                  <p:par>
-                    <p:cTn id="19" fill="hold">
-                      <p:stCondLst>
-                        <p:cond delay="indefinite"/>
-                      </p:stCondLst>
-                      <p:childTnLst>
-                        <p:par>
-                          <p:cTn id="20" fill="hold">
-                            <p:stCondLst>
-                              <p:cond delay="0"/>
-                            </p:stCondLst>
-                            <p:childTnLst>
-                              <p:par>
-                                <p:cTn id="21" presetID="1" presetClass="entr" presetSubtype="0" fill="hold" nodeType="clickEffect">
-                                  <p:stCondLst>
-                                    <p:cond delay="0"/>
-                                  </p:stCondLst>
-                                  <p:childTnLst>
-                                    <p:set>
-                                      <p:cBhvr>
-                                        <p:cTn id="22" dur="1" fill="hold">
-                                          <p:stCondLst>
-                                            <p:cond delay="0"/>
-                                          </p:stCondLst>
-                                        </p:cTn>
-                                        <p:tgtEl>
-                                          <p:spTgt spid="108"/>
-                                        </p:tgtEl>
-                                        <p:attrNameLst>
-                                          <p:attrName>style.visibility</p:attrName>
-                                        </p:attrNameLst>
-                                      </p:cBhvr>
-                                      <p:to>
-                                        <p:strVal val="visible"/>
-                                      </p:to>
-                                    </p:set>
-                                  </p:childTnLst>
-                                </p:cTn>
-                              </p:par>
-                            </p:childTnLst>
-                          </p:cTn>
-                        </p:par>
-                      </p:childTnLst>
-                    </p:cTn>
-                  </p:par>
-                  <p:par>
-                    <p:cTn id="23" fill="hold">
-                      <p:stCondLst>
-                        <p:cond delay="indefinite"/>
-                      </p:stCondLst>
-                      <p:childTnLst>
-                        <p:par>
-                          <p:cTn id="24" fill="hold">
-                            <p:stCondLst>
-                              <p:cond delay="0"/>
-                            </p:stCondLst>
-                            <p:childTnLst>
-                              <p:par>
-                                <p:cTn id="25" presetID="1" presetClass="entr" presetSubtype="0" fill="hold" nodeType="clickEffect">
-                                  <p:stCondLst>
-                                    <p:cond delay="0"/>
-                                  </p:stCondLst>
-                                  <p:childTnLst>
-                                    <p:set>
-                                      <p:cBhvr>
-                                        <p:cTn id="26" dur="1" fill="hold">
-                                          <p:stCondLst>
-                                            <p:cond delay="0"/>
-                                          </p:stCondLst>
-                                        </p:cTn>
-                                        <p:tgtEl>
                                           <p:spTgt spid="36"/>
                                         </p:tgtEl>
                                         <p:attrNameLst>
@@ -9764,14 +9411,14 @@
                                 </p:cTn>
                               </p:par>
                               <p:par>
-                                <p:cTn id="27" presetID="1" presetClass="entr" presetSubtype="0" fill="hold" nodeType="withEffect">
+                                <p:cTn id="19" presetID="1" presetClass="entr" presetSubtype="0" fill="hold" nodeType="withEffect">
                                   <p:stCondLst>
                                     <p:cond delay="0"/>
                                   </p:stCondLst>
                                   <p:childTnLst>
                                     <p:set>
                                       <p:cBhvr>
-                                        <p:cTn id="28" dur="1" fill="hold">
+                                        <p:cTn id="20" dur="1" fill="hold">
                                           <p:stCondLst>
                                             <p:cond delay="0"/>
                                           </p:stCondLst>
@@ -9791,14 +9438,14 @@
                                 </p:cTn>
                               </p:par>
                               <p:par>
-                                <p:cTn id="29" presetID="1" presetClass="entr" presetSubtype="0" fill="hold" nodeType="withEffect">
+                                <p:cTn id="21" presetID="1" presetClass="entr" presetSubtype="0" fill="hold" nodeType="withEffect">
                                   <p:stCondLst>
                                     <p:cond delay="0"/>
                                   </p:stCondLst>
                                   <p:childTnLst>
                                     <p:set>
                                       <p:cBhvr>
-                                        <p:cTn id="30" dur="1" fill="hold">
+                                        <p:cTn id="22" dur="1" fill="hold">
                                           <p:stCondLst>
                                             <p:cond delay="0"/>
                                           </p:stCondLst>
@@ -9818,14 +9465,14 @@
                                 </p:cTn>
                               </p:par>
                               <p:par>
-                                <p:cTn id="31" presetID="1" presetClass="entr" presetSubtype="0" fill="hold" nodeType="withEffect">
+                                <p:cTn id="23" presetID="1" presetClass="entr" presetSubtype="0" fill="hold" nodeType="withEffect">
                                   <p:stCondLst>
                                     <p:cond delay="0"/>
                                   </p:stCondLst>
                                   <p:childTnLst>
                                     <p:set>
                                       <p:cBhvr>
-                                        <p:cTn id="32" dur="1" fill="hold">
+                                        <p:cTn id="24" dur="1" fill="hold">
                                           <p:stCondLst>
                                             <p:cond delay="0"/>
                                           </p:stCondLst>
@@ -11011,9 +10658,12 @@
 </file>
 
 <file path=customXml/item1.xml><?xml version="1.0" encoding="utf-8"?>
-<p:properties xmlns:p="http://schemas.microsoft.com/office/2006/metadata/properties" xmlns:xsi="http://www.w3.org/2001/XMLSchema-instance" xmlns:pc="http://schemas.microsoft.com/office/infopath/2007/PartnerControls">
-  <documentManagement/>
-</p:properties>
+<?mso-contentType ?>
+<FormTemplates xmlns="http://schemas.microsoft.com/sharepoint/v3/contenttype/forms">
+  <Display>DocumentLibraryForm</Display>
+  <Edit>DocumentLibraryForm</Edit>
+  <New>DocumentLibraryForm</New>
+</FormTemplates>
 </file>
 
 <file path=customXml/item2.xml><?xml version="1.0" encoding="utf-8"?>
@@ -11240,27 +10890,15 @@
 </file>
 
 <file path=customXml/item3.xml><?xml version="1.0" encoding="utf-8"?>
-<?mso-contentType ?>
-<FormTemplates xmlns="http://schemas.microsoft.com/sharepoint/v3/contenttype/forms">
-  <Display>DocumentLibraryForm</Display>
-  <Edit>DocumentLibraryForm</Edit>
-  <New>DocumentLibraryForm</New>
-</FormTemplates>
+<p:properties xmlns:p="http://schemas.microsoft.com/office/2006/metadata/properties" xmlns:xsi="http://www.w3.org/2001/XMLSchema-instance" xmlns:pc="http://schemas.microsoft.com/office/infopath/2007/PartnerControls">
+  <documentManagement/>
+</p:properties>
 </file>
 
 <file path=customXml/itemProps1.xml><?xml version="1.0" encoding="utf-8"?>
-<ds:datastoreItem xmlns:ds="http://schemas.openxmlformats.org/officeDocument/2006/customXml" ds:itemID="{30D3F7B2-E865-49C4-B6C4-1C3489F322E5}">
+<ds:datastoreItem xmlns:ds="http://schemas.openxmlformats.org/officeDocument/2006/customXml" ds:itemID="{B2402960-8EF3-4234-B7C9-25E125FD4CA5}">
   <ds:schemaRefs>
-    <ds:schemaRef ds:uri="http://purl.org/dc/elements/1.1/"/>
-    <ds:schemaRef ds:uri="http://schemas.microsoft.com/office/2006/metadata/properties"/>
-    <ds:schemaRef ds:uri="4327b14a-fe89-488e-9f6d-9658cacf372b"/>
-    <ds:schemaRef ds:uri="bbcd8c33-6940-4d4c-a587-bbc736ca1e4d"/>
-    <ds:schemaRef ds:uri="http://purl.org/dc/terms/"/>
-    <ds:schemaRef ds:uri="http://schemas.openxmlformats.org/package/2006/metadata/core-properties"/>
-    <ds:schemaRef ds:uri="http://schemas.microsoft.com/office/2006/documentManagement/types"/>
-    <ds:schemaRef ds:uri="http://schemas.microsoft.com/office/infopath/2007/PartnerControls"/>
-    <ds:schemaRef ds:uri="http://www.w3.org/XML/1998/namespace"/>
-    <ds:schemaRef ds:uri="http://purl.org/dc/dcmitype/"/>
+    <ds:schemaRef ds:uri="http://schemas.microsoft.com/sharepoint/v3/contenttype/forms"/>
   </ds:schemaRefs>
 </ds:datastoreItem>
 </file>
@@ -11285,9 +10923,18 @@
 </file>
 
 <file path=customXml/itemProps3.xml><?xml version="1.0" encoding="utf-8"?>
-<ds:datastoreItem xmlns:ds="http://schemas.openxmlformats.org/officeDocument/2006/customXml" ds:itemID="{B2402960-8EF3-4234-B7C9-25E125FD4CA5}">
+<ds:datastoreItem xmlns:ds="http://schemas.openxmlformats.org/officeDocument/2006/customXml" ds:itemID="{30D3F7B2-E865-49C4-B6C4-1C3489F322E5}">
   <ds:schemaRefs>
-    <ds:schemaRef ds:uri="http://schemas.microsoft.com/sharepoint/v3/contenttype/forms"/>
+    <ds:schemaRef ds:uri="http://purl.org/dc/elements/1.1/"/>
+    <ds:schemaRef ds:uri="http://schemas.microsoft.com/office/2006/metadata/properties"/>
+    <ds:schemaRef ds:uri="4327b14a-fe89-488e-9f6d-9658cacf372b"/>
+    <ds:schemaRef ds:uri="bbcd8c33-6940-4d4c-a587-bbc736ca1e4d"/>
+    <ds:schemaRef ds:uri="http://purl.org/dc/terms/"/>
+    <ds:schemaRef ds:uri="http://schemas.openxmlformats.org/package/2006/metadata/core-properties"/>
+    <ds:schemaRef ds:uri="http://schemas.microsoft.com/office/2006/documentManagement/types"/>
+    <ds:schemaRef ds:uri="http://schemas.microsoft.com/office/infopath/2007/PartnerControls"/>
+    <ds:schemaRef ds:uri="http://www.w3.org/XML/1998/namespace"/>
+    <ds:schemaRef ds:uri="http://purl.org/dc/dcmitype/"/>
   </ds:schemaRefs>
 </ds:datastoreItem>
 </file>
</xml_diff>

<commit_message>
white papar, uat e atualizacao docs
</commit_message>
<xml_diff>
--- a/Documentação/Diagrama de Solução de Software/Diagrama de Solução de Software v1.pptx
+++ b/Documentação/Diagrama de Solução de Software/Diagrama de Solução de Software v1.pptx
@@ -6,13 +6,14 @@
     <p:sldMasterId id="2147483665" r:id="rId5"/>
   </p:sldMasterIdLst>
   <p:notesMasterIdLst>
-    <p:notesMasterId r:id="rId7"/>
+    <p:notesMasterId r:id="rId8"/>
   </p:notesMasterIdLst>
   <p:handoutMasterIdLst>
-    <p:handoutMasterId r:id="rId8"/>
+    <p:handoutMasterId r:id="rId9"/>
   </p:handoutMasterIdLst>
   <p:sldIdLst>
     <p:sldId id="901" r:id="rId6"/>
+    <p:sldId id="905" r:id="rId7"/>
   </p:sldIdLst>
   <p:sldSz cx="13442950" cy="7561263"/>
   <p:notesSz cx="6858000" cy="9144000"/>
@@ -133,8 +134,63 @@
 </p:presentation>
 </file>
 
+<file path=ppt/revisionInfo.xml><?xml version="1.0" encoding="utf-8"?>
+<p1510:revInfo xmlns:a="http://schemas.openxmlformats.org/drawingml/2006/main" xmlns:r="http://schemas.openxmlformats.org/officeDocument/2006/relationships" xmlns:p1510="http://schemas.microsoft.com/office/powerpoint/2015/10/main">
+  <p1510:revLst>
+    <p1510:client id="{2D8A1717-CAEF-4F22-A30B-39A900A837E1}" v="1" dt="2021-11-16T23:58:07.559"/>
+  </p1510:revLst>
+</p1510:revInfo>
+</file>
+
 <file path=ppt/changesInfos/changesInfo1.xml><?xml version="1.0" encoding="utf-8"?>
 <pc:chgInfo xmlns:a="http://schemas.openxmlformats.org/drawingml/2006/main" xmlns:r="http://schemas.openxmlformats.org/officeDocument/2006/relationships" xmlns:ac="http://schemas.microsoft.com/office/drawing/2013/main/command" xmlns:pc="http://schemas.microsoft.com/office/powerpoint/2013/main/command">
+  <pc:docChgLst>
+    <pc:chgData name="Vinicius Cano" userId="e988c080-1d50-4980-86fe-45a1167ad471" providerId="ADAL" clId="{2D8A1717-CAEF-4F22-A30B-39A900A837E1}"/>
+    <pc:docChg chg="undo custSel addSld modSld">
+      <pc:chgData name="Vinicius Cano" userId="e988c080-1d50-4980-86fe-45a1167ad471" providerId="ADAL" clId="{2D8A1717-CAEF-4F22-A30B-39A900A837E1}" dt="2021-11-16T23:58:29.448" v="42" actId="20577"/>
+      <pc:docMkLst>
+        <pc:docMk/>
+      </pc:docMkLst>
+      <pc:sldChg chg="addSp delSp modSp mod">
+        <pc:chgData name="Vinicius Cano" userId="e988c080-1d50-4980-86fe-45a1167ad471" providerId="ADAL" clId="{2D8A1717-CAEF-4F22-A30B-39A900A837E1}" dt="2021-11-16T23:58:03.755" v="24" actId="22"/>
+        <pc:sldMkLst>
+          <pc:docMk/>
+          <pc:sldMk cId="2659641936" sldId="901"/>
+        </pc:sldMkLst>
+        <pc:spChg chg="add del">
+          <ac:chgData name="Vinicius Cano" userId="e988c080-1d50-4980-86fe-45a1167ad471" providerId="ADAL" clId="{2D8A1717-CAEF-4F22-A30B-39A900A837E1}" dt="2021-11-16T23:58:03.755" v="24" actId="22"/>
+          <ac:spMkLst>
+            <pc:docMk/>
+            <pc:sldMk cId="2659641936" sldId="901"/>
+            <ac:spMk id="33" creationId="{8E3BB7B0-8215-4CCE-9CC6-7DD8F928FC24}"/>
+          </ac:spMkLst>
+        </pc:spChg>
+        <pc:spChg chg="mod">
+          <ac:chgData name="Vinicius Cano" userId="e988c080-1d50-4980-86fe-45a1167ad471" providerId="ADAL" clId="{2D8A1717-CAEF-4F22-A30B-39A900A837E1}" dt="2021-11-16T23:31:27.746" v="22" actId="20577"/>
+          <ac:spMkLst>
+            <pc:docMk/>
+            <pc:sldMk cId="2659641936" sldId="901"/>
+            <ac:spMk id="65" creationId="{40CA6EB5-1EBF-2641-8459-9218946B7D83}"/>
+          </ac:spMkLst>
+        </pc:spChg>
+      </pc:sldChg>
+      <pc:sldChg chg="modSp add mod">
+        <pc:chgData name="Vinicius Cano" userId="e988c080-1d50-4980-86fe-45a1167ad471" providerId="ADAL" clId="{2D8A1717-CAEF-4F22-A30B-39A900A837E1}" dt="2021-11-16T23:58:29.448" v="42" actId="20577"/>
+        <pc:sldMkLst>
+          <pc:docMk/>
+          <pc:sldMk cId="3244439550" sldId="905"/>
+        </pc:sldMkLst>
+        <pc:spChg chg="mod">
+          <ac:chgData name="Vinicius Cano" userId="e988c080-1d50-4980-86fe-45a1167ad471" providerId="ADAL" clId="{2D8A1717-CAEF-4F22-A30B-39A900A837E1}" dt="2021-11-16T23:58:29.448" v="42" actId="20577"/>
+          <ac:spMkLst>
+            <pc:docMk/>
+            <pc:sldMk cId="3244439550" sldId="905"/>
+            <ac:spMk id="4" creationId="{00000000-0000-0000-0000-000000000000}"/>
+          </ac:spMkLst>
+        </pc:spChg>
+      </pc:sldChg>
+    </pc:docChg>
+  </pc:docChgLst>
   <pc:docChgLst>
     <pc:chgData name="Vinicius Cano" userId="e988c080-1d50-4980-86fe-45a1167ad471" providerId="ADAL" clId="{480DBBF9-4B14-4839-BDB8-5DED642FCB5E}"/>
     <pc:docChg chg="modSld">
@@ -285,7 +341,7 @@
             <a:fld id="{C3CD65D1-5C11-455D-9F9A-0E035F00A0DA}" type="datetimeFigureOut">
               <a:rPr lang="pt-BR" smtClean="0"/>
               <a:pPr/>
-              <a:t>19/10/2021</a:t>
+              <a:t>16/11/2021</a:t>
             </a:fld>
             <a:endParaRPr lang="pt-BR"/>
           </a:p>
@@ -453,7 +509,7 @@
             <a:fld id="{A05DA3EF-18EA-43DE-B1BB-402A3C558822}" type="datetimeFigureOut">
               <a:rPr lang="pt-BR" smtClean="0"/>
               <a:pPr/>
-              <a:t>19/10/2021</a:t>
+              <a:t>16/11/2021</a:t>
             </a:fld>
             <a:endParaRPr lang="pt-BR"/>
           </a:p>
@@ -795,6 +851,91 @@
     <p:extLst>
       <p:ext uri="{BB962C8B-B14F-4D97-AF65-F5344CB8AC3E}">
         <p14:creationId xmlns:p14="http://schemas.microsoft.com/office/powerpoint/2010/main" val="2743913104"/>
+      </p:ext>
+    </p:extLst>
+  </p:cSld>
+  <p:clrMapOvr>
+    <a:masterClrMapping/>
+  </p:clrMapOvr>
+</p:notes>
+</file>
+
+<file path=ppt/notesSlides/notesSlide2.xml><?xml version="1.0" encoding="utf-8"?>
+<p:notes xmlns:a="http://schemas.openxmlformats.org/drawingml/2006/main" xmlns:r="http://schemas.openxmlformats.org/officeDocument/2006/relationships" xmlns:p="http://schemas.openxmlformats.org/presentationml/2006/main">
+  <p:cSld>
+    <p:spTree>
+      <p:nvGrpSpPr>
+        <p:cNvPr id="1" name=""/>
+        <p:cNvGrpSpPr/>
+        <p:nvPr/>
+      </p:nvGrpSpPr>
+      <p:grpSpPr>
+        <a:xfrm>
+          <a:off x="0" y="0"/>
+          <a:ext cx="0" cy="0"/>
+          <a:chOff x="0" y="0"/>
+          <a:chExt cx="0" cy="0"/>
+        </a:xfrm>
+      </p:grpSpPr>
+      <p:sp>
+        <p:nvSpPr>
+          <p:cNvPr id="2" name="Slide Image Placeholder 1"/>
+          <p:cNvSpPr>
+            <a:spLocks noGrp="1" noRot="1" noChangeAspect="1"/>
+          </p:cNvSpPr>
+          <p:nvPr>
+            <p:ph type="sldImg"/>
+          </p:nvPr>
+        </p:nvSpPr>
+        <p:spPr/>
+      </p:sp>
+      <p:sp>
+        <p:nvSpPr>
+          <p:cNvPr id="3" name="Notes Placeholder 2"/>
+          <p:cNvSpPr>
+            <a:spLocks noGrp="1"/>
+          </p:cNvSpPr>
+          <p:nvPr>
+            <p:ph type="body" idx="1"/>
+          </p:nvPr>
+        </p:nvSpPr>
+        <p:spPr/>
+        <p:txBody>
+          <a:bodyPr/>
+          <a:lstStyle/>
+          <a:p>
+            <a:endParaRPr lang="pt-BR"/>
+          </a:p>
+        </p:txBody>
+      </p:sp>
+      <p:sp>
+        <p:nvSpPr>
+          <p:cNvPr id="4" name="Slide Number Placeholder 3"/>
+          <p:cNvSpPr>
+            <a:spLocks noGrp="1"/>
+          </p:cNvSpPr>
+          <p:nvPr>
+            <p:ph type="sldNum" sz="quarter" idx="5"/>
+          </p:nvPr>
+        </p:nvSpPr>
+        <p:spPr/>
+        <p:txBody>
+          <a:bodyPr/>
+          <a:lstStyle/>
+          <a:p>
+            <a:fld id="{75B3645A-D0AE-4F6E-A17E-E0036A9041AF}" type="slidenum">
+              <a:rPr lang="pt-BR" smtClean="0"/>
+              <a:pPr/>
+              <a:t>2</a:t>
+            </a:fld>
+            <a:endParaRPr lang="pt-BR"/>
+          </a:p>
+        </p:txBody>
+      </p:sp>
+    </p:spTree>
+    <p:extLst>
+      <p:ext uri="{BB962C8B-B14F-4D97-AF65-F5344CB8AC3E}">
+        <p14:creationId xmlns:p14="http://schemas.microsoft.com/office/powerpoint/2010/main" val="2555108314"/>
       </p:ext>
     </p:extLst>
   </p:cSld>
@@ -8579,7 +8720,7 @@
           <p:spPr>
             <a:xfrm>
               <a:off x="7123023" y="5819930"/>
-              <a:ext cx="2566458" cy="584775"/>
+              <a:ext cx="2566458" cy="830997"/>
             </a:xfrm>
             <a:prstGeom prst="rect">
               <a:avLst/>
@@ -8600,7 +8741,7 @@
                     <a:prstClr val="white"/>
                   </a:solidFill>
                 </a:rPr>
-                <a:t>Dashboard financeira, cadastro de clientes</a:t>
+                <a:t>Dashboard financeira, cadastro de clientes e veículos</a:t>
               </a:r>
               <a:endParaRPr lang="pt-BR" sz="1200" dirty="0">
                 <a:solidFill>
@@ -9520,6 +9661,3850 @@
     </p:tnLst>
     <p:bldLst>
       <p:bldP spid="6" grpId="0" animBg="1"/>
+    </p:bldLst>
+  </p:timing>
+</p:sld>
+</file>
+
+<file path=ppt/slides/slide2.xml><?xml version="1.0" encoding="utf-8"?>
+<p:sld xmlns:a="http://schemas.openxmlformats.org/drawingml/2006/main" xmlns:r="http://schemas.openxmlformats.org/officeDocument/2006/relationships" xmlns:p="http://schemas.openxmlformats.org/presentationml/2006/main">
+  <p:cSld>
+    <p:spTree>
+      <p:nvGrpSpPr>
+        <p:cNvPr id="1" name=""/>
+        <p:cNvGrpSpPr/>
+        <p:nvPr/>
+      </p:nvGrpSpPr>
+      <p:grpSpPr>
+        <a:xfrm>
+          <a:off x="0" y="0"/>
+          <a:ext cx="0" cy="0"/>
+          <a:chOff x="0" y="0"/>
+          <a:chExt cx="0" cy="0"/>
+        </a:xfrm>
+      </p:grpSpPr>
+      <p:sp>
+        <p:nvSpPr>
+          <p:cNvPr id="109" name="Retângulo 29">
+            <a:extLst>
+              <a:ext uri="{FF2B5EF4-FFF2-40B4-BE49-F238E27FC236}">
+                <a16:creationId xmlns:a16="http://schemas.microsoft.com/office/drawing/2014/main" id="{40D7BF1A-655B-324F-B3D4-B1A904D3B5CE}"/>
+              </a:ext>
+            </a:extLst>
+          </p:cNvPr>
+          <p:cNvSpPr/>
+          <p:nvPr/>
+        </p:nvSpPr>
+        <p:spPr>
+          <a:xfrm>
+            <a:off x="3480865" y="1256075"/>
+            <a:ext cx="9865346" cy="3959181"/>
+          </a:xfrm>
+          <a:prstGeom prst="rect">
+            <a:avLst/>
+          </a:prstGeom>
+          <a:noFill/>
+          <a:ln>
+            <a:solidFill>
+              <a:srgbClr val="253746"/>
+            </a:solidFill>
+            <a:prstDash val="dash"/>
+          </a:ln>
+        </p:spPr>
+        <p:style>
+          <a:lnRef idx="2">
+            <a:schemeClr val="accent1">
+              <a:shade val="50000"/>
+            </a:schemeClr>
+          </a:lnRef>
+          <a:fillRef idx="1">
+            <a:schemeClr val="accent1"/>
+          </a:fillRef>
+          <a:effectRef idx="0">
+            <a:schemeClr val="accent1"/>
+          </a:effectRef>
+          <a:fontRef idx="minor">
+            <a:schemeClr val="lt1"/>
+          </a:fontRef>
+        </p:style>
+        <p:txBody>
+          <a:bodyPr rtlCol="0" anchor="ctr"/>
+          <a:lstStyle/>
+          <a:p>
+            <a:pPr algn="ctr"/>
+            <a:endParaRPr lang="pt-BR" sz="1800">
+              <a:solidFill>
+                <a:prstClr val="white"/>
+              </a:solidFill>
+              <a:latin typeface="Calibri"/>
+            </a:endParaRPr>
+          </a:p>
+        </p:txBody>
+      </p:sp>
+      <p:sp>
+        <p:nvSpPr>
+          <p:cNvPr id="3" name="Espaço Reservado para Número de Slide 2"/>
+          <p:cNvSpPr>
+            <a:spLocks noGrp="1"/>
+          </p:cNvSpPr>
+          <p:nvPr>
+            <p:ph type="sldNum" sz="quarter" idx="4"/>
+          </p:nvPr>
+        </p:nvSpPr>
+        <p:spPr>
+          <a:xfrm>
+            <a:off x="12645557" y="7237015"/>
+            <a:ext cx="628646" cy="214290"/>
+          </a:xfrm>
+        </p:spPr>
+        <p:txBody>
+          <a:bodyPr/>
+          <a:lstStyle/>
+          <a:p>
+            <a:pPr>
+              <a:defRPr/>
+            </a:pPr>
+            <a:fld id="{B66251D2-9488-44CD-87B4-F793A73C4A01}" type="slidenum">
+              <a:rPr lang="pt-BR" smtClean="0"/>
+              <a:pPr>
+                <a:defRPr/>
+              </a:pPr>
+              <a:t>2</a:t>
+            </a:fld>
+            <a:endParaRPr lang="pt-BR" sz="880"/>
+          </a:p>
+        </p:txBody>
+      </p:sp>
+      <p:sp>
+        <p:nvSpPr>
+          <p:cNvPr id="4" name="Espaço Reservado para Texto 3"/>
+          <p:cNvSpPr>
+            <a:spLocks noGrp="1"/>
+          </p:cNvSpPr>
+          <p:nvPr>
+            <p:ph type="body" sz="quarter" idx="13"/>
+          </p:nvPr>
+        </p:nvSpPr>
+        <p:spPr>
+          <a:xfrm>
+            <a:off x="2219929" y="109958"/>
+            <a:ext cx="11521279" cy="765639"/>
+          </a:xfrm>
+        </p:spPr>
+        <p:txBody>
+          <a:bodyPr/>
+          <a:lstStyle/>
+          <a:p>
+            <a:r>
+              <a:rPr lang="pt-BR" sz="3600" dirty="0"/>
+              <a:t>Diagrama </a:t>
+            </a:r>
+            <a:r>
+              <a:rPr lang="pt-BR" sz="3600"/>
+              <a:t>de Software - Componentes  </a:t>
+            </a:r>
+            <a:endParaRPr lang="pt-BR" sz="3600" dirty="0"/>
+          </a:p>
+        </p:txBody>
+      </p:sp>
+      <p:sp>
+        <p:nvSpPr>
+          <p:cNvPr id="6" name="Fluxograma: Disco Magnético 5">
+            <a:extLst>
+              <a:ext uri="{FF2B5EF4-FFF2-40B4-BE49-F238E27FC236}">
+                <a16:creationId xmlns:a16="http://schemas.microsoft.com/office/drawing/2014/main" id="{DFFFB317-3CAB-44CC-8FEF-51A27734CA19}"/>
+              </a:ext>
+            </a:extLst>
+          </p:cNvPr>
+          <p:cNvSpPr/>
+          <p:nvPr/>
+        </p:nvSpPr>
+        <p:spPr>
+          <a:xfrm>
+            <a:off x="532766" y="1260351"/>
+            <a:ext cx="2350434" cy="2016224"/>
+          </a:xfrm>
+          <a:prstGeom prst="flowChartMagneticDisk">
+            <a:avLst/>
+          </a:prstGeom>
+          <a:solidFill>
+            <a:schemeClr val="bg1">
+              <a:lumMod val="50000"/>
+            </a:schemeClr>
+          </a:solidFill>
+          <a:ln>
+            <a:solidFill>
+              <a:srgbClr val="253746"/>
+            </a:solidFill>
+          </a:ln>
+        </p:spPr>
+        <p:style>
+          <a:lnRef idx="2">
+            <a:schemeClr val="accent1">
+              <a:shade val="50000"/>
+            </a:schemeClr>
+          </a:lnRef>
+          <a:fillRef idx="1">
+            <a:schemeClr val="accent1"/>
+          </a:fillRef>
+          <a:effectRef idx="0">
+            <a:schemeClr val="accent1"/>
+          </a:effectRef>
+          <a:fontRef idx="minor">
+            <a:schemeClr val="lt1"/>
+          </a:fontRef>
+        </p:style>
+        <p:txBody>
+          <a:bodyPr rtlCol="0" anchor="ctr"/>
+          <a:lstStyle/>
+          <a:p>
+            <a:pPr algn="ctr"/>
+            <a:endParaRPr lang="pt-BR" sz="1800">
+              <a:solidFill>
+                <a:prstClr val="white"/>
+              </a:solidFill>
+              <a:latin typeface="Calibri"/>
+            </a:endParaRPr>
+          </a:p>
+        </p:txBody>
+      </p:sp>
+      <p:cxnSp>
+        <p:nvCxnSpPr>
+          <p:cNvPr id="108" name="Conector de Seta Reta 107">
+            <a:extLst>
+              <a:ext uri="{FF2B5EF4-FFF2-40B4-BE49-F238E27FC236}">
+                <a16:creationId xmlns:a16="http://schemas.microsoft.com/office/drawing/2014/main" id="{88AF183C-AF91-49F6-B2E7-A0B82E68B260}"/>
+              </a:ext>
+            </a:extLst>
+          </p:cNvPr>
+          <p:cNvCxnSpPr>
+            <a:cxnSpLocks/>
+            <a:stCxn id="58" idx="1"/>
+            <a:endCxn id="6" idx="4"/>
+          </p:cNvCxnSpPr>
+          <p:nvPr/>
+        </p:nvCxnSpPr>
+        <p:spPr>
+          <a:xfrm flipH="1">
+            <a:off x="2883200" y="2136352"/>
+            <a:ext cx="1065722" cy="132111"/>
+          </a:xfrm>
+          <a:prstGeom prst="straightConnector1">
+            <a:avLst/>
+          </a:prstGeom>
+          <a:ln w="19050">
+            <a:solidFill>
+              <a:schemeClr val="accent5">
+                <a:lumMod val="75000"/>
+              </a:schemeClr>
+            </a:solidFill>
+            <a:prstDash val="sysDash"/>
+            <a:headEnd type="none" w="lg" len="lg"/>
+            <a:tailEnd type="triangle" w="lg" len="lg"/>
+          </a:ln>
+        </p:spPr>
+        <p:style>
+          <a:lnRef idx="1">
+            <a:schemeClr val="accent1"/>
+          </a:lnRef>
+          <a:fillRef idx="0">
+            <a:schemeClr val="accent1"/>
+          </a:fillRef>
+          <a:effectRef idx="0">
+            <a:schemeClr val="accent1"/>
+          </a:effectRef>
+          <a:fontRef idx="minor">
+            <a:schemeClr val="tx1"/>
+          </a:fontRef>
+        </p:style>
+      </p:cxnSp>
+      <p:grpSp>
+        <p:nvGrpSpPr>
+          <p:cNvPr id="36" name="Group 35">
+            <a:extLst>
+              <a:ext uri="{FF2B5EF4-FFF2-40B4-BE49-F238E27FC236}">
+                <a16:creationId xmlns:a16="http://schemas.microsoft.com/office/drawing/2014/main" id="{C11E98B6-FD4F-A340-AE37-2AB983DDB323}"/>
+              </a:ext>
+            </a:extLst>
+          </p:cNvPr>
+          <p:cNvGrpSpPr/>
+          <p:nvPr/>
+        </p:nvGrpSpPr>
+        <p:grpSpPr>
+          <a:xfrm>
+            <a:off x="3672887" y="5614618"/>
+            <a:ext cx="2304256" cy="1766413"/>
+            <a:chOff x="9889827" y="4597388"/>
+            <a:chExt cx="2566458" cy="2089582"/>
+          </a:xfrm>
+        </p:grpSpPr>
+        <p:grpSp>
+          <p:nvGrpSpPr>
+            <p:cNvPr id="32" name="Group 31">
+              <a:extLst>
+                <a:ext uri="{FF2B5EF4-FFF2-40B4-BE49-F238E27FC236}">
+                  <a16:creationId xmlns:a16="http://schemas.microsoft.com/office/drawing/2014/main" id="{2CC5B7AC-CD77-6F46-8EC2-55133D24A073}"/>
+                </a:ext>
+              </a:extLst>
+            </p:cNvPr>
+            <p:cNvGrpSpPr/>
+            <p:nvPr/>
+          </p:nvGrpSpPr>
+          <p:grpSpPr>
+            <a:xfrm>
+              <a:off x="10024908" y="4597388"/>
+              <a:ext cx="2307052" cy="2089582"/>
+              <a:chOff x="7252020" y="3571513"/>
+              <a:chExt cx="2376264" cy="2178569"/>
+            </a:xfrm>
+          </p:grpSpPr>
+          <p:sp>
+            <p:nvSpPr>
+              <p:cNvPr id="49" name="Retângulo 48">
+                <a:extLst>
+                  <a:ext uri="{FF2B5EF4-FFF2-40B4-BE49-F238E27FC236}">
+                    <a16:creationId xmlns:a16="http://schemas.microsoft.com/office/drawing/2014/main" id="{B354B805-38E0-48D8-A21E-F7B79225D816}"/>
+                  </a:ext>
+                </a:extLst>
+              </p:cNvPr>
+              <p:cNvSpPr/>
+              <p:nvPr/>
+            </p:nvSpPr>
+            <p:spPr>
+              <a:xfrm>
+                <a:off x="7683409" y="4788743"/>
+                <a:ext cx="1198306" cy="338554"/>
+              </a:xfrm>
+              <a:prstGeom prst="rect">
+                <a:avLst/>
+              </a:prstGeom>
+            </p:spPr>
+            <p:txBody>
+              <a:bodyPr wrap="square">
+                <a:spAutoFit/>
+              </a:bodyPr>
+              <a:lstStyle/>
+              <a:p>
+                <a:pPr lvl="0">
+                  <a:defRPr/>
+                </a:pPr>
+                <a:r>
+                  <a:rPr lang="pt-BR" sz="1600">
+                    <a:solidFill>
+                      <a:prstClr val="white"/>
+                    </a:solidFill>
+                  </a:rPr>
+                  <a:t>Dashboard</a:t>
+                </a:r>
+              </a:p>
+            </p:txBody>
+          </p:sp>
+          <p:sp>
+            <p:nvSpPr>
+              <p:cNvPr id="31" name="Rounded Rectangle 30">
+                <a:extLst>
+                  <a:ext uri="{FF2B5EF4-FFF2-40B4-BE49-F238E27FC236}">
+                    <a16:creationId xmlns:a16="http://schemas.microsoft.com/office/drawing/2014/main" id="{8DBD3C4E-8CC7-D64B-87EC-3B156ABEF290}"/>
+                  </a:ext>
+                </a:extLst>
+              </p:cNvPr>
+              <p:cNvSpPr/>
+              <p:nvPr/>
+            </p:nvSpPr>
+            <p:spPr>
+              <a:xfrm>
+                <a:off x="7252020" y="3571513"/>
+                <a:ext cx="2376264" cy="2178569"/>
+              </a:xfrm>
+              <a:prstGeom prst="roundRect">
+                <a:avLst/>
+              </a:prstGeom>
+              <a:solidFill>
+                <a:srgbClr val="32B9CD"/>
+              </a:solidFill>
+              <a:ln>
+                <a:solidFill>
+                  <a:schemeClr val="accent5">
+                    <a:lumMod val="75000"/>
+                  </a:schemeClr>
+                </a:solidFill>
+              </a:ln>
+            </p:spPr>
+            <p:style>
+              <a:lnRef idx="2">
+                <a:schemeClr val="accent1">
+                  <a:shade val="50000"/>
+                </a:schemeClr>
+              </a:lnRef>
+              <a:fillRef idx="1">
+                <a:schemeClr val="accent1"/>
+              </a:fillRef>
+              <a:effectRef idx="0">
+                <a:schemeClr val="accent1"/>
+              </a:effectRef>
+              <a:fontRef idx="minor">
+                <a:schemeClr val="lt1"/>
+              </a:fontRef>
+            </p:style>
+            <p:txBody>
+              <a:bodyPr rtlCol="0" anchor="ctr"/>
+              <a:lstStyle/>
+              <a:p>
+                <a:pPr algn="ctr"/>
+                <a:endParaRPr lang="pt-BR">
+                  <a:solidFill>
+                    <a:prstClr val="white"/>
+                  </a:solidFill>
+                  <a:latin typeface="Calibri"/>
+                </a:endParaRPr>
+              </a:p>
+            </p:txBody>
+          </p:sp>
+          <p:cxnSp>
+            <p:nvCxnSpPr>
+              <p:cNvPr id="30" name="Straight Connector 29">
+                <a:extLst>
+                  <a:ext uri="{FF2B5EF4-FFF2-40B4-BE49-F238E27FC236}">
+                    <a16:creationId xmlns:a16="http://schemas.microsoft.com/office/drawing/2014/main" id="{31AE2028-FEEB-E24A-A160-6CC6C7291EB7}"/>
+                  </a:ext>
+                </a:extLst>
+              </p:cNvPr>
+              <p:cNvCxnSpPr/>
+              <p:nvPr/>
+            </p:nvCxnSpPr>
+            <p:spPr>
+              <a:xfrm>
+                <a:off x="9097739" y="3708623"/>
+                <a:ext cx="275406" cy="0"/>
+              </a:xfrm>
+              <a:prstGeom prst="line">
+                <a:avLst/>
+              </a:prstGeom>
+              <a:noFill/>
+              <a:ln>
+                <a:solidFill>
+                  <a:schemeClr val="accent5">
+                    <a:lumMod val="75000"/>
+                  </a:schemeClr>
+                </a:solidFill>
+              </a:ln>
+            </p:spPr>
+            <p:style>
+              <a:lnRef idx="2">
+                <a:schemeClr val="accent1">
+                  <a:shade val="50000"/>
+                </a:schemeClr>
+              </a:lnRef>
+              <a:fillRef idx="1">
+                <a:schemeClr val="accent1"/>
+              </a:fillRef>
+              <a:effectRef idx="0">
+                <a:schemeClr val="accent1"/>
+              </a:effectRef>
+              <a:fontRef idx="minor">
+                <a:schemeClr val="lt1"/>
+              </a:fontRef>
+            </p:style>
+          </p:cxnSp>
+          <p:cxnSp>
+            <p:nvCxnSpPr>
+              <p:cNvPr id="60" name="Straight Connector 59">
+                <a:extLst>
+                  <a:ext uri="{FF2B5EF4-FFF2-40B4-BE49-F238E27FC236}">
+                    <a16:creationId xmlns:a16="http://schemas.microsoft.com/office/drawing/2014/main" id="{7C268994-2FBA-3B41-B0BF-3CA95711E0BA}"/>
+                  </a:ext>
+                </a:extLst>
+              </p:cNvPr>
+              <p:cNvCxnSpPr/>
+              <p:nvPr/>
+            </p:nvCxnSpPr>
+            <p:spPr>
+              <a:xfrm>
+                <a:off x="9097739" y="3792372"/>
+                <a:ext cx="275406" cy="0"/>
+              </a:xfrm>
+              <a:prstGeom prst="line">
+                <a:avLst/>
+              </a:prstGeom>
+              <a:noFill/>
+              <a:ln>
+                <a:solidFill>
+                  <a:schemeClr val="accent5">
+                    <a:lumMod val="75000"/>
+                  </a:schemeClr>
+                </a:solidFill>
+              </a:ln>
+            </p:spPr>
+            <p:style>
+              <a:lnRef idx="2">
+                <a:schemeClr val="accent1">
+                  <a:shade val="50000"/>
+                </a:schemeClr>
+              </a:lnRef>
+              <a:fillRef idx="1">
+                <a:schemeClr val="accent1"/>
+              </a:fillRef>
+              <a:effectRef idx="0">
+                <a:schemeClr val="accent1"/>
+              </a:effectRef>
+              <a:fontRef idx="minor">
+                <a:schemeClr val="lt1"/>
+              </a:fontRef>
+            </p:style>
+          </p:cxnSp>
+          <p:cxnSp>
+            <p:nvCxnSpPr>
+              <p:cNvPr id="61" name="Straight Connector 60">
+                <a:extLst>
+                  <a:ext uri="{FF2B5EF4-FFF2-40B4-BE49-F238E27FC236}">
+                    <a16:creationId xmlns:a16="http://schemas.microsoft.com/office/drawing/2014/main" id="{5D671D1F-7DF1-F94F-8786-64632D2143D9}"/>
+                  </a:ext>
+                </a:extLst>
+              </p:cNvPr>
+              <p:cNvCxnSpPr/>
+              <p:nvPr/>
+            </p:nvCxnSpPr>
+            <p:spPr>
+              <a:xfrm>
+                <a:off x="9097739" y="3879370"/>
+                <a:ext cx="275406" cy="0"/>
+              </a:xfrm>
+              <a:prstGeom prst="line">
+                <a:avLst/>
+              </a:prstGeom>
+              <a:noFill/>
+              <a:ln>
+                <a:solidFill>
+                  <a:schemeClr val="accent5">
+                    <a:lumMod val="75000"/>
+                  </a:schemeClr>
+                </a:solidFill>
+              </a:ln>
+            </p:spPr>
+            <p:style>
+              <a:lnRef idx="2">
+                <a:schemeClr val="accent1">
+                  <a:shade val="50000"/>
+                </a:schemeClr>
+              </a:lnRef>
+              <a:fillRef idx="1">
+                <a:schemeClr val="accent1"/>
+              </a:fillRef>
+              <a:effectRef idx="0">
+                <a:schemeClr val="accent1"/>
+              </a:effectRef>
+              <a:fontRef idx="minor">
+                <a:schemeClr val="lt1"/>
+              </a:fontRef>
+            </p:style>
+          </p:cxnSp>
+        </p:grpSp>
+        <p:sp>
+          <p:nvSpPr>
+            <p:cNvPr id="74" name="Retângulo 20">
+              <a:extLst>
+                <a:ext uri="{FF2B5EF4-FFF2-40B4-BE49-F238E27FC236}">
+                  <a16:creationId xmlns:a16="http://schemas.microsoft.com/office/drawing/2014/main" id="{3F292C9C-808C-6F48-BF50-B6128A0E250B}"/>
+                </a:ext>
+              </a:extLst>
+            </p:cNvPr>
+            <p:cNvSpPr/>
+            <p:nvPr/>
+          </p:nvSpPr>
+          <p:spPr>
+            <a:xfrm>
+              <a:off x="9889827" y="4967599"/>
+              <a:ext cx="2566458" cy="764579"/>
+            </a:xfrm>
+            <a:prstGeom prst="rect">
+              <a:avLst/>
+            </a:prstGeom>
+          </p:spPr>
+          <p:txBody>
+            <a:bodyPr wrap="square">
+              <a:spAutoFit/>
+            </a:bodyPr>
+            <a:lstStyle/>
+            <a:p>
+              <a:pPr lvl="0" algn="ctr">
+                <a:defRPr/>
+              </a:pPr>
+              <a:r>
+                <a:rPr lang="pt-BR" sz="2000" b="1" dirty="0" err="1">
+                  <a:solidFill>
+                    <a:prstClr val="white"/>
+                  </a:solidFill>
+                </a:rPr>
+                <a:t>MobileApp</a:t>
+              </a:r>
+              <a:endParaRPr lang="pt-BR" sz="2000" b="1" dirty="0">
+                <a:solidFill>
+                  <a:prstClr val="white"/>
+                </a:solidFill>
+              </a:endParaRPr>
+            </a:p>
+            <a:p>
+              <a:pPr lvl="0" algn="ctr">
+                <a:defRPr/>
+              </a:pPr>
+              <a:r>
+                <a:rPr lang="pt-BR" sz="1600" dirty="0">
+                  <a:solidFill>
+                    <a:prstClr val="white"/>
+                  </a:solidFill>
+                </a:rPr>
+                <a:t>[Container: </a:t>
+              </a:r>
+              <a:r>
+                <a:rPr lang="pt-BR" sz="1600" dirty="0" err="1">
+                  <a:solidFill>
+                    <a:prstClr val="white"/>
+                  </a:solidFill>
+                </a:rPr>
+                <a:t>Kotlin</a:t>
+              </a:r>
+              <a:r>
+                <a:rPr lang="pt-BR" sz="1600" dirty="0">
+                  <a:solidFill>
+                    <a:prstClr val="white"/>
+                  </a:solidFill>
+                </a:rPr>
+                <a:t>]</a:t>
+              </a:r>
+            </a:p>
+          </p:txBody>
+        </p:sp>
+        <p:sp>
+          <p:nvSpPr>
+            <p:cNvPr id="75" name="Retângulo 20">
+              <a:extLst>
+                <a:ext uri="{FF2B5EF4-FFF2-40B4-BE49-F238E27FC236}">
+                  <a16:creationId xmlns:a16="http://schemas.microsoft.com/office/drawing/2014/main" id="{93F43B3C-AD9B-8B41-9E5E-1EB9FAF3EDC1}"/>
+                </a:ext>
+              </a:extLst>
+            </p:cNvPr>
+            <p:cNvSpPr/>
+            <p:nvPr/>
+          </p:nvSpPr>
+          <p:spPr>
+            <a:xfrm>
+              <a:off x="9998671" y="5868863"/>
+              <a:ext cx="2307052" cy="691761"/>
+            </a:xfrm>
+            <a:prstGeom prst="rect">
+              <a:avLst/>
+            </a:prstGeom>
+          </p:spPr>
+          <p:txBody>
+            <a:bodyPr wrap="square">
+              <a:spAutoFit/>
+            </a:bodyPr>
+            <a:lstStyle/>
+            <a:p>
+              <a:pPr lvl="0" algn="ctr">
+                <a:defRPr/>
+              </a:pPr>
+              <a:r>
+                <a:rPr lang="pt-BR" sz="1600" dirty="0">
+                  <a:solidFill>
+                    <a:prstClr val="white"/>
+                  </a:solidFill>
+                </a:rPr>
+                <a:t>Versão simplificada para aplicação mobile</a:t>
+              </a:r>
+              <a:endParaRPr lang="pt-BR" sz="1200" dirty="0">
+                <a:solidFill>
+                  <a:prstClr val="white"/>
+                </a:solidFill>
+              </a:endParaRPr>
+            </a:p>
+          </p:txBody>
+        </p:sp>
+      </p:grpSp>
+      <p:cxnSp>
+        <p:nvCxnSpPr>
+          <p:cNvPr id="85" name="Conector de Seta Reta 107">
+            <a:extLst>
+              <a:ext uri="{FF2B5EF4-FFF2-40B4-BE49-F238E27FC236}">
+                <a16:creationId xmlns:a16="http://schemas.microsoft.com/office/drawing/2014/main" id="{1108A93A-35E5-9049-BE49-87D127EF0677}"/>
+              </a:ext>
+            </a:extLst>
+          </p:cNvPr>
+          <p:cNvCxnSpPr>
+            <a:cxnSpLocks/>
+            <a:stCxn id="87" idx="0"/>
+          </p:cNvCxnSpPr>
+          <p:nvPr/>
+        </p:nvCxnSpPr>
+        <p:spPr>
+          <a:xfrm flipH="1" flipV="1">
+            <a:off x="5977144" y="2689615"/>
+            <a:ext cx="1380540" cy="491546"/>
+          </a:xfrm>
+          <a:prstGeom prst="straightConnector1">
+            <a:avLst/>
+          </a:prstGeom>
+          <a:ln w="19050">
+            <a:solidFill>
+              <a:schemeClr val="accent5">
+                <a:lumMod val="75000"/>
+              </a:schemeClr>
+            </a:solidFill>
+            <a:prstDash val="sysDash"/>
+            <a:headEnd type="none" w="lg" len="lg"/>
+            <a:tailEnd type="triangle" w="lg" len="lg"/>
+          </a:ln>
+        </p:spPr>
+        <p:style>
+          <a:lnRef idx="1">
+            <a:schemeClr val="accent1"/>
+          </a:lnRef>
+          <a:fillRef idx="0">
+            <a:schemeClr val="accent1"/>
+          </a:fillRef>
+          <a:effectRef idx="0">
+            <a:schemeClr val="accent1"/>
+          </a:effectRef>
+          <a:fontRef idx="minor">
+            <a:schemeClr val="tx1"/>
+          </a:fontRef>
+        </p:style>
+      </p:cxnSp>
+      <p:sp>
+        <p:nvSpPr>
+          <p:cNvPr id="100" name="Retângulo 20">
+            <a:extLst>
+              <a:ext uri="{FF2B5EF4-FFF2-40B4-BE49-F238E27FC236}">
+                <a16:creationId xmlns:a16="http://schemas.microsoft.com/office/drawing/2014/main" id="{9BB1489B-C560-CD4C-A3EF-D59CA6357904}"/>
+              </a:ext>
+            </a:extLst>
+          </p:cNvPr>
+          <p:cNvSpPr/>
+          <p:nvPr/>
+        </p:nvSpPr>
+        <p:spPr>
+          <a:xfrm>
+            <a:off x="384771" y="1835065"/>
+            <a:ext cx="2566458" cy="646331"/>
+          </a:xfrm>
+          <a:prstGeom prst="rect">
+            <a:avLst/>
+          </a:prstGeom>
+        </p:spPr>
+        <p:txBody>
+          <a:bodyPr wrap="square">
+            <a:spAutoFit/>
+          </a:bodyPr>
+          <a:lstStyle/>
+          <a:p>
+            <a:pPr lvl="0" algn="ctr">
+              <a:defRPr/>
+            </a:pPr>
+            <a:r>
+              <a:rPr lang="pt-BR" sz="2000" b="1" err="1">
+                <a:solidFill>
+                  <a:prstClr val="white"/>
+                </a:solidFill>
+              </a:rPr>
+              <a:t>Database</a:t>
+            </a:r>
+            <a:endParaRPr lang="pt-BR" sz="2000" b="1">
+              <a:solidFill>
+                <a:prstClr val="white"/>
+              </a:solidFill>
+            </a:endParaRPr>
+          </a:p>
+          <a:p>
+            <a:pPr lvl="0" algn="ctr">
+              <a:defRPr/>
+            </a:pPr>
+            <a:r>
+              <a:rPr lang="pt-BR" sz="1600">
+                <a:solidFill>
+                  <a:prstClr val="white"/>
+                </a:solidFill>
+              </a:rPr>
+              <a:t>[Container: SQL Server]</a:t>
+            </a:r>
+          </a:p>
+        </p:txBody>
+      </p:sp>
+      <p:sp>
+        <p:nvSpPr>
+          <p:cNvPr id="101" name="Retângulo 20">
+            <a:extLst>
+              <a:ext uri="{FF2B5EF4-FFF2-40B4-BE49-F238E27FC236}">
+                <a16:creationId xmlns:a16="http://schemas.microsoft.com/office/drawing/2014/main" id="{FC798C42-61A5-3943-A3F4-72A0AB9C9EDA}"/>
+              </a:ext>
+            </a:extLst>
+          </p:cNvPr>
+          <p:cNvSpPr/>
+          <p:nvPr/>
+        </p:nvSpPr>
+        <p:spPr>
+          <a:xfrm>
+            <a:off x="434927" y="2484487"/>
+            <a:ext cx="2566458" cy="584775"/>
+          </a:xfrm>
+          <a:prstGeom prst="rect">
+            <a:avLst/>
+          </a:prstGeom>
+        </p:spPr>
+        <p:txBody>
+          <a:bodyPr wrap="square">
+            <a:spAutoFit/>
+          </a:bodyPr>
+          <a:lstStyle/>
+          <a:p>
+            <a:pPr lvl="0" algn="ctr">
+              <a:defRPr/>
+            </a:pPr>
+            <a:r>
+              <a:rPr lang="pt-BR" sz="1600">
+                <a:solidFill>
+                  <a:prstClr val="white"/>
+                </a:solidFill>
+              </a:rPr>
+              <a:t>Armazena os dados das máquinas e dos cadastros.</a:t>
+            </a:r>
+            <a:endParaRPr lang="pt-BR" sz="1200">
+              <a:solidFill>
+                <a:prstClr val="white"/>
+              </a:solidFill>
+            </a:endParaRPr>
+          </a:p>
+        </p:txBody>
+      </p:sp>
+      <p:grpSp>
+        <p:nvGrpSpPr>
+          <p:cNvPr id="57" name="Group 79">
+            <a:extLst>
+              <a:ext uri="{FF2B5EF4-FFF2-40B4-BE49-F238E27FC236}">
+                <a16:creationId xmlns:a16="http://schemas.microsoft.com/office/drawing/2014/main" id="{EDA1A6A0-10A3-4138-8F31-5CDE1B0652D0}"/>
+              </a:ext>
+            </a:extLst>
+          </p:cNvPr>
+          <p:cNvGrpSpPr/>
+          <p:nvPr/>
+        </p:nvGrpSpPr>
+        <p:grpSpPr>
+          <a:xfrm>
+            <a:off x="3871153" y="1410822"/>
+            <a:ext cx="2110740" cy="1494815"/>
+            <a:chOff x="3258758" y="4711163"/>
+            <a:chExt cx="2814160" cy="2109171"/>
+          </a:xfrm>
+        </p:grpSpPr>
+        <p:sp>
+          <p:nvSpPr>
+            <p:cNvPr id="58" name="Retângulo 57">
+              <a:extLst>
+                <a:ext uri="{FF2B5EF4-FFF2-40B4-BE49-F238E27FC236}">
+                  <a16:creationId xmlns:a16="http://schemas.microsoft.com/office/drawing/2014/main" id="{4000FE8E-6356-42EC-AF6C-746EC6A19251}"/>
+                </a:ext>
+              </a:extLst>
+            </p:cNvPr>
+            <p:cNvSpPr/>
+            <p:nvPr/>
+          </p:nvSpPr>
+          <p:spPr>
+            <a:xfrm>
+              <a:off x="3362444" y="4726767"/>
+              <a:ext cx="2710474" cy="2016224"/>
+            </a:xfrm>
+            <a:prstGeom prst="rect">
+              <a:avLst/>
+            </a:prstGeom>
+            <a:solidFill>
+              <a:srgbClr val="32B9CD"/>
+            </a:solidFill>
+            <a:ln>
+              <a:solidFill>
+                <a:schemeClr val="accent5">
+                  <a:lumMod val="75000"/>
+                </a:schemeClr>
+              </a:solidFill>
+            </a:ln>
+          </p:spPr>
+          <p:style>
+            <a:lnRef idx="2">
+              <a:schemeClr val="accent1">
+                <a:shade val="50000"/>
+              </a:schemeClr>
+            </a:lnRef>
+            <a:fillRef idx="1">
+              <a:schemeClr val="accent1"/>
+            </a:fillRef>
+            <a:effectRef idx="0">
+              <a:schemeClr val="accent1"/>
+            </a:effectRef>
+            <a:fontRef idx="minor">
+              <a:schemeClr val="lt1"/>
+            </a:fontRef>
+          </p:style>
+          <p:txBody>
+            <a:bodyPr rtlCol="0" anchor="ctr"/>
+            <a:lstStyle/>
+            <a:p>
+              <a:pPr algn="ctr"/>
+              <a:endParaRPr lang="pt-BR">
+                <a:solidFill>
+                  <a:prstClr val="white"/>
+                </a:solidFill>
+                <a:latin typeface="Calibri"/>
+              </a:endParaRPr>
+            </a:p>
+          </p:txBody>
+        </p:sp>
+        <p:sp>
+          <p:nvSpPr>
+            <p:cNvPr id="59" name="Retângulo 58">
+              <a:extLst>
+                <a:ext uri="{FF2B5EF4-FFF2-40B4-BE49-F238E27FC236}">
+                  <a16:creationId xmlns:a16="http://schemas.microsoft.com/office/drawing/2014/main" id="{FB904B6E-7224-4428-8476-BF7DDC730520}"/>
+                </a:ext>
+              </a:extLst>
+            </p:cNvPr>
+            <p:cNvSpPr/>
+            <p:nvPr/>
+          </p:nvSpPr>
+          <p:spPr>
+            <a:xfrm>
+              <a:off x="3553271" y="5474097"/>
+              <a:ext cx="2278425" cy="1346237"/>
+            </a:xfrm>
+            <a:prstGeom prst="rect">
+              <a:avLst/>
+            </a:prstGeom>
+          </p:spPr>
+          <p:txBody>
+            <a:bodyPr wrap="square">
+              <a:spAutoFit/>
+            </a:bodyPr>
+            <a:lstStyle/>
+            <a:p>
+              <a:pPr lvl="0" algn="ctr">
+                <a:defRPr/>
+              </a:pPr>
+              <a:r>
+                <a:rPr lang="pt-BR" sz="1400">
+                  <a:solidFill>
+                    <a:prstClr val="white"/>
+                  </a:solidFill>
+                </a:rPr>
+                <a:t>Componente que gerencia as conexões e transações com o Banco de Dados</a:t>
+              </a:r>
+            </a:p>
+          </p:txBody>
+        </p:sp>
+        <p:sp>
+          <p:nvSpPr>
+            <p:cNvPr id="62" name="Retângulo 20">
+              <a:extLst>
+                <a:ext uri="{FF2B5EF4-FFF2-40B4-BE49-F238E27FC236}">
+                  <a16:creationId xmlns:a16="http://schemas.microsoft.com/office/drawing/2014/main" id="{898445EF-0450-4939-9A2F-3F0009C0FE74}"/>
+                </a:ext>
+              </a:extLst>
+            </p:cNvPr>
+            <p:cNvSpPr/>
+            <p:nvPr/>
+          </p:nvSpPr>
+          <p:spPr>
+            <a:xfrm>
+              <a:off x="3258758" y="4711163"/>
+              <a:ext cx="2807827" cy="825113"/>
+            </a:xfrm>
+            <a:prstGeom prst="rect">
+              <a:avLst/>
+            </a:prstGeom>
+          </p:spPr>
+          <p:txBody>
+            <a:bodyPr wrap="square">
+              <a:spAutoFit/>
+            </a:bodyPr>
+            <a:lstStyle/>
+            <a:p>
+              <a:pPr lvl="0" algn="ctr">
+                <a:defRPr/>
+              </a:pPr>
+              <a:r>
+                <a:rPr lang="pt-BR" sz="1800" b="1" dirty="0">
+                  <a:solidFill>
+                    <a:prstClr val="white"/>
+                  </a:solidFill>
+                </a:rPr>
+                <a:t>ORM</a:t>
+              </a:r>
+            </a:p>
+            <a:p>
+              <a:pPr lvl="0" algn="ctr">
+                <a:defRPr/>
+              </a:pPr>
+              <a:r>
+                <a:rPr lang="pt-BR" sz="1400" dirty="0">
+                  <a:solidFill>
+                    <a:prstClr val="white"/>
+                  </a:solidFill>
+                </a:rPr>
+                <a:t>[</a:t>
+              </a:r>
+              <a:r>
+                <a:rPr lang="pt-BR" sz="1400" dirty="0" err="1">
+                  <a:solidFill>
+                    <a:prstClr val="white"/>
+                  </a:solidFill>
+                </a:rPr>
+                <a:t>Component</a:t>
+              </a:r>
+              <a:r>
+                <a:rPr lang="pt-BR" sz="1400" dirty="0">
+                  <a:solidFill>
+                    <a:prstClr val="white"/>
+                  </a:solidFill>
+                </a:rPr>
+                <a:t>: JPA]</a:t>
+              </a:r>
+            </a:p>
+          </p:txBody>
+        </p:sp>
+      </p:grpSp>
+      <p:grpSp>
+        <p:nvGrpSpPr>
+          <p:cNvPr id="68" name="Group 79">
+            <a:extLst>
+              <a:ext uri="{FF2B5EF4-FFF2-40B4-BE49-F238E27FC236}">
+                <a16:creationId xmlns:a16="http://schemas.microsoft.com/office/drawing/2014/main" id="{9EA09B06-5B5A-4E83-B9AC-6F858E856D84}"/>
+              </a:ext>
+            </a:extLst>
+          </p:cNvPr>
+          <p:cNvGrpSpPr/>
+          <p:nvPr/>
+        </p:nvGrpSpPr>
+        <p:grpSpPr>
+          <a:xfrm>
+            <a:off x="10683898" y="1350946"/>
+            <a:ext cx="2105990" cy="1428941"/>
+            <a:chOff x="3286924" y="4699652"/>
+            <a:chExt cx="2807827" cy="2016223"/>
+          </a:xfrm>
+        </p:grpSpPr>
+        <p:sp>
+          <p:nvSpPr>
+            <p:cNvPr id="69" name="Retângulo 68">
+              <a:extLst>
+                <a:ext uri="{FF2B5EF4-FFF2-40B4-BE49-F238E27FC236}">
+                  <a16:creationId xmlns:a16="http://schemas.microsoft.com/office/drawing/2014/main" id="{B5831869-9973-4FAC-9067-A742CEEC5EA6}"/>
+                </a:ext>
+              </a:extLst>
+            </p:cNvPr>
+            <p:cNvSpPr/>
+            <p:nvPr/>
+          </p:nvSpPr>
+          <p:spPr>
+            <a:xfrm>
+              <a:off x="3300904" y="4699652"/>
+              <a:ext cx="2710474" cy="2016223"/>
+            </a:xfrm>
+            <a:prstGeom prst="rect">
+              <a:avLst/>
+            </a:prstGeom>
+            <a:solidFill>
+              <a:srgbClr val="32B9CD"/>
+            </a:solidFill>
+            <a:ln>
+              <a:solidFill>
+                <a:schemeClr val="accent5">
+                  <a:lumMod val="75000"/>
+                </a:schemeClr>
+              </a:solidFill>
+            </a:ln>
+          </p:spPr>
+          <p:style>
+            <a:lnRef idx="2">
+              <a:schemeClr val="accent1">
+                <a:shade val="50000"/>
+              </a:schemeClr>
+            </a:lnRef>
+            <a:fillRef idx="1">
+              <a:schemeClr val="accent1"/>
+            </a:fillRef>
+            <a:effectRef idx="0">
+              <a:schemeClr val="accent1"/>
+            </a:effectRef>
+            <a:fontRef idx="minor">
+              <a:schemeClr val="lt1"/>
+            </a:fontRef>
+          </p:style>
+          <p:txBody>
+            <a:bodyPr rtlCol="0" anchor="ctr"/>
+            <a:lstStyle/>
+            <a:p>
+              <a:pPr algn="ctr"/>
+              <a:endParaRPr lang="pt-BR" sz="2000">
+                <a:solidFill>
+                  <a:prstClr val="white"/>
+                </a:solidFill>
+                <a:latin typeface="Calibri"/>
+              </a:endParaRPr>
+            </a:p>
+          </p:txBody>
+        </p:sp>
+        <p:sp>
+          <p:nvSpPr>
+            <p:cNvPr id="73" name="Retângulo 72">
+              <a:extLst>
+                <a:ext uri="{FF2B5EF4-FFF2-40B4-BE49-F238E27FC236}">
+                  <a16:creationId xmlns:a16="http://schemas.microsoft.com/office/drawing/2014/main" id="{3ECBCEAF-FA77-4F76-9A41-7515C823010B}"/>
+                </a:ext>
+              </a:extLst>
+            </p:cNvPr>
+            <p:cNvSpPr/>
+            <p:nvPr/>
+          </p:nvSpPr>
+          <p:spPr>
+            <a:xfrm>
+              <a:off x="3379132" y="5780482"/>
+              <a:ext cx="2591923" cy="738259"/>
+            </a:xfrm>
+            <a:prstGeom prst="rect">
+              <a:avLst/>
+            </a:prstGeom>
+          </p:spPr>
+          <p:txBody>
+            <a:bodyPr wrap="square">
+              <a:spAutoFit/>
+            </a:bodyPr>
+            <a:lstStyle/>
+            <a:p>
+              <a:pPr lvl="0" algn="ctr">
+                <a:defRPr/>
+              </a:pPr>
+              <a:r>
+                <a:rPr lang="pt-BR" sz="1400" dirty="0">
+                  <a:solidFill>
+                    <a:prstClr val="white"/>
+                  </a:solidFill>
+                </a:rPr>
+                <a:t>Cadastra e lista os veículos cadastrados</a:t>
+              </a:r>
+              <a:endParaRPr lang="pt-BR" sz="1100" dirty="0">
+                <a:solidFill>
+                  <a:prstClr val="white"/>
+                </a:solidFill>
+              </a:endParaRPr>
+            </a:p>
+          </p:txBody>
+        </p:sp>
+        <p:sp>
+          <p:nvSpPr>
+            <p:cNvPr id="76" name="Retângulo 20">
+              <a:extLst>
+                <a:ext uri="{FF2B5EF4-FFF2-40B4-BE49-F238E27FC236}">
+                  <a16:creationId xmlns:a16="http://schemas.microsoft.com/office/drawing/2014/main" id="{6CFF9DFD-876E-406B-A10B-04614BF83BE0}"/>
+                </a:ext>
+              </a:extLst>
+            </p:cNvPr>
+            <p:cNvSpPr/>
+            <p:nvPr/>
+          </p:nvSpPr>
+          <p:spPr>
+            <a:xfrm>
+              <a:off x="3286924" y="4709777"/>
+              <a:ext cx="2807827" cy="1129102"/>
+            </a:xfrm>
+            <a:prstGeom prst="rect">
+              <a:avLst/>
+            </a:prstGeom>
+          </p:spPr>
+          <p:txBody>
+            <a:bodyPr wrap="square">
+              <a:spAutoFit/>
+            </a:bodyPr>
+            <a:lstStyle/>
+            <a:p>
+              <a:pPr lvl="0" algn="ctr">
+                <a:defRPr/>
+              </a:pPr>
+              <a:r>
+                <a:rPr lang="pt-BR" sz="1800" b="1" dirty="0">
+                  <a:solidFill>
+                    <a:prstClr val="white"/>
+                  </a:solidFill>
+                </a:rPr>
+                <a:t>Veiculo </a:t>
+              </a:r>
+              <a:r>
+                <a:rPr lang="pt-BR" sz="1800" b="1" dirty="0" err="1">
+                  <a:solidFill>
+                    <a:prstClr val="white"/>
+                  </a:solidFill>
+                </a:rPr>
+                <a:t>Controller</a:t>
+              </a:r>
+              <a:endParaRPr lang="pt-BR" sz="1800" b="1" dirty="0">
+                <a:solidFill>
+                  <a:prstClr val="white"/>
+                </a:solidFill>
+              </a:endParaRPr>
+            </a:p>
+            <a:p>
+              <a:pPr lvl="0" algn="ctr">
+                <a:defRPr/>
+              </a:pPr>
+              <a:r>
+                <a:rPr lang="pt-BR" sz="1400" dirty="0">
+                  <a:solidFill>
+                    <a:prstClr val="white"/>
+                  </a:solidFill>
+                </a:rPr>
+                <a:t>[</a:t>
+              </a:r>
+              <a:r>
+                <a:rPr lang="pt-BR" sz="1400" dirty="0" err="1">
+                  <a:solidFill>
+                    <a:prstClr val="white"/>
+                  </a:solidFill>
+                </a:rPr>
+                <a:t>Component</a:t>
+              </a:r>
+              <a:r>
+                <a:rPr lang="pt-BR" sz="1400" dirty="0">
+                  <a:solidFill>
+                    <a:prstClr val="white"/>
+                  </a:solidFill>
+                </a:rPr>
+                <a:t>: Spring Service]</a:t>
+              </a:r>
+            </a:p>
+          </p:txBody>
+        </p:sp>
+      </p:grpSp>
+      <p:grpSp>
+        <p:nvGrpSpPr>
+          <p:cNvPr id="83" name="Group 38">
+            <a:extLst>
+              <a:ext uri="{FF2B5EF4-FFF2-40B4-BE49-F238E27FC236}">
+                <a16:creationId xmlns:a16="http://schemas.microsoft.com/office/drawing/2014/main" id="{39FBAFE6-4F58-439D-9C6F-AFAB6C6F6539}"/>
+              </a:ext>
+            </a:extLst>
+          </p:cNvPr>
+          <p:cNvGrpSpPr/>
+          <p:nvPr/>
+        </p:nvGrpSpPr>
+        <p:grpSpPr>
+          <a:xfrm>
+            <a:off x="6297128" y="3131378"/>
+            <a:ext cx="2111081" cy="1713411"/>
+            <a:chOff x="8823095" y="1524475"/>
+            <a:chExt cx="2578711" cy="2016224"/>
+          </a:xfrm>
+        </p:grpSpPr>
+        <p:sp>
+          <p:nvSpPr>
+            <p:cNvPr id="84" name="Retângulo 83">
+              <a:extLst>
+                <a:ext uri="{FF2B5EF4-FFF2-40B4-BE49-F238E27FC236}">
+                  <a16:creationId xmlns:a16="http://schemas.microsoft.com/office/drawing/2014/main" id="{FBE9AE95-6A8E-499D-8249-8B0D3FE154AE}"/>
+                </a:ext>
+              </a:extLst>
+            </p:cNvPr>
+            <p:cNvSpPr/>
+            <p:nvPr/>
+          </p:nvSpPr>
+          <p:spPr>
+            <a:xfrm>
+              <a:off x="8902687" y="1524475"/>
+              <a:ext cx="2376264" cy="2016224"/>
+            </a:xfrm>
+            <a:prstGeom prst="rect">
+              <a:avLst/>
+            </a:prstGeom>
+            <a:ln w="57150">
+              <a:solidFill>
+                <a:schemeClr val="accent5">
+                  <a:lumMod val="75000"/>
+                </a:schemeClr>
+              </a:solidFill>
+            </a:ln>
+          </p:spPr>
+          <p:style>
+            <a:lnRef idx="2">
+              <a:schemeClr val="accent5">
+                <a:shade val="50000"/>
+              </a:schemeClr>
+            </a:lnRef>
+            <a:fillRef idx="1">
+              <a:schemeClr val="accent5"/>
+            </a:fillRef>
+            <a:effectRef idx="0">
+              <a:schemeClr val="accent5"/>
+            </a:effectRef>
+            <a:fontRef idx="minor">
+              <a:schemeClr val="lt1"/>
+            </a:fontRef>
+          </p:style>
+          <p:txBody>
+            <a:bodyPr rtlCol="0" anchor="ctr"/>
+            <a:lstStyle/>
+            <a:p>
+              <a:pPr algn="ctr"/>
+              <a:endParaRPr lang="pt-BR" sz="1600">
+                <a:solidFill>
+                  <a:prstClr val="white"/>
+                </a:solidFill>
+                <a:latin typeface="Calibri"/>
+              </a:endParaRPr>
+            </a:p>
+          </p:txBody>
+        </p:sp>
+        <p:sp>
+          <p:nvSpPr>
+            <p:cNvPr id="87" name="Retângulo 86">
+              <a:extLst>
+                <a:ext uri="{FF2B5EF4-FFF2-40B4-BE49-F238E27FC236}">
+                  <a16:creationId xmlns:a16="http://schemas.microsoft.com/office/drawing/2014/main" id="{C17C8BE1-3AF4-48F1-8BEC-C85D77E8F999}"/>
+                </a:ext>
+              </a:extLst>
+            </p:cNvPr>
+            <p:cNvSpPr/>
+            <p:nvPr/>
+          </p:nvSpPr>
+          <p:spPr>
+            <a:xfrm>
+              <a:off x="8835348" y="1583056"/>
+              <a:ext cx="2566458" cy="1077337"/>
+            </a:xfrm>
+            <a:prstGeom prst="rect">
+              <a:avLst/>
+            </a:prstGeom>
+          </p:spPr>
+          <p:txBody>
+            <a:bodyPr wrap="square">
+              <a:spAutoFit/>
+            </a:bodyPr>
+            <a:lstStyle/>
+            <a:p>
+              <a:pPr lvl="0" algn="ctr">
+                <a:defRPr/>
+              </a:pPr>
+              <a:r>
+                <a:rPr lang="pt-BR" sz="1600" b="1" dirty="0">
+                  <a:solidFill>
+                    <a:prstClr val="white"/>
+                  </a:solidFill>
+                </a:rPr>
+                <a:t>Financeiro </a:t>
+              </a:r>
+              <a:r>
+                <a:rPr lang="pt-BR" sz="1600" b="1" dirty="0" err="1">
+                  <a:solidFill>
+                    <a:prstClr val="white"/>
+                  </a:solidFill>
+                </a:rPr>
+                <a:t>Controller</a:t>
+              </a:r>
+              <a:endParaRPr lang="pt-BR" sz="1600" b="1" dirty="0">
+                <a:solidFill>
+                  <a:prstClr val="white"/>
+                </a:solidFill>
+              </a:endParaRPr>
+            </a:p>
+            <a:p>
+              <a:pPr lvl="0" algn="ctr">
+                <a:defRPr/>
+              </a:pPr>
+              <a:r>
+                <a:rPr lang="pt-BR" sz="1400" dirty="0">
+                  <a:solidFill>
+                    <a:prstClr val="white"/>
+                  </a:solidFill>
+                </a:rPr>
+                <a:t>[</a:t>
+              </a:r>
+              <a:r>
+                <a:rPr lang="pt-BR" sz="1400" dirty="0" err="1">
+                  <a:solidFill>
+                    <a:prstClr val="white"/>
+                  </a:solidFill>
+                </a:rPr>
+                <a:t>Component</a:t>
+              </a:r>
+              <a:r>
+                <a:rPr lang="pt-BR" sz="1400" dirty="0">
+                  <a:solidFill>
+                    <a:prstClr val="white"/>
+                  </a:solidFill>
+                </a:rPr>
+                <a:t>: Spring MVC </a:t>
+              </a:r>
+              <a:r>
+                <a:rPr lang="pt-BR" sz="1400" dirty="0" err="1">
+                  <a:solidFill>
+                    <a:prstClr val="white"/>
+                  </a:solidFill>
+                </a:rPr>
+                <a:t>Rest</a:t>
+              </a:r>
+              <a:r>
+                <a:rPr lang="pt-BR" sz="1400" dirty="0">
+                  <a:solidFill>
+                    <a:prstClr val="white"/>
+                  </a:solidFill>
+                </a:rPr>
+                <a:t> </a:t>
+              </a:r>
+              <a:r>
+                <a:rPr lang="pt-BR" sz="1400" dirty="0" err="1">
+                  <a:solidFill>
+                    <a:prstClr val="white"/>
+                  </a:solidFill>
+                </a:rPr>
+                <a:t>Controller</a:t>
+              </a:r>
+              <a:r>
+                <a:rPr lang="pt-BR" sz="1400" dirty="0">
+                  <a:solidFill>
+                    <a:prstClr val="white"/>
+                  </a:solidFill>
+                </a:rPr>
+                <a:t>]</a:t>
+              </a:r>
+            </a:p>
+          </p:txBody>
+        </p:sp>
+        <p:sp>
+          <p:nvSpPr>
+            <p:cNvPr id="88" name="Retângulo 20">
+              <a:extLst>
+                <a:ext uri="{FF2B5EF4-FFF2-40B4-BE49-F238E27FC236}">
+                  <a16:creationId xmlns:a16="http://schemas.microsoft.com/office/drawing/2014/main" id="{2A44DCE7-B848-40FC-8984-3B25F40DE9B9}"/>
+                </a:ext>
+              </a:extLst>
+            </p:cNvPr>
+            <p:cNvSpPr/>
+            <p:nvPr/>
+          </p:nvSpPr>
+          <p:spPr>
+            <a:xfrm>
+              <a:off x="8823095" y="2624163"/>
+              <a:ext cx="2566458" cy="615689"/>
+            </a:xfrm>
+            <a:prstGeom prst="rect">
+              <a:avLst/>
+            </a:prstGeom>
+          </p:spPr>
+          <p:txBody>
+            <a:bodyPr wrap="square">
+              <a:spAutoFit/>
+            </a:bodyPr>
+            <a:lstStyle/>
+            <a:p>
+              <a:pPr lvl="0" algn="ctr">
+                <a:defRPr/>
+              </a:pPr>
+              <a:r>
+                <a:rPr lang="pt-BR" sz="1400" dirty="0">
+                  <a:solidFill>
+                    <a:prstClr val="white"/>
+                  </a:solidFill>
+                </a:rPr>
+                <a:t>Cadastra e lista as transações cadastradas</a:t>
+              </a:r>
+              <a:endParaRPr lang="pt-BR" sz="1100" dirty="0">
+                <a:solidFill>
+                  <a:prstClr val="white"/>
+                </a:solidFill>
+              </a:endParaRPr>
+            </a:p>
+          </p:txBody>
+        </p:sp>
+      </p:grpSp>
+      <p:grpSp>
+        <p:nvGrpSpPr>
+          <p:cNvPr id="89" name="Group 38">
+            <a:extLst>
+              <a:ext uri="{FF2B5EF4-FFF2-40B4-BE49-F238E27FC236}">
+                <a16:creationId xmlns:a16="http://schemas.microsoft.com/office/drawing/2014/main" id="{328A115B-B062-4627-ABED-EF820E5DE0F6}"/>
+              </a:ext>
+            </a:extLst>
+          </p:cNvPr>
+          <p:cNvGrpSpPr/>
+          <p:nvPr/>
+        </p:nvGrpSpPr>
+        <p:grpSpPr>
+          <a:xfrm>
+            <a:off x="3966088" y="3420751"/>
+            <a:ext cx="2101050" cy="1440000"/>
+            <a:chOff x="8788108" y="1515280"/>
+            <a:chExt cx="2566458" cy="2016224"/>
+          </a:xfrm>
+        </p:grpSpPr>
+        <p:sp>
+          <p:nvSpPr>
+            <p:cNvPr id="90" name="Retângulo 89">
+              <a:extLst>
+                <a:ext uri="{FF2B5EF4-FFF2-40B4-BE49-F238E27FC236}">
+                  <a16:creationId xmlns:a16="http://schemas.microsoft.com/office/drawing/2014/main" id="{FF6A9949-8A4B-4867-A92F-C81E3064B0E5}"/>
+                </a:ext>
+              </a:extLst>
+            </p:cNvPr>
+            <p:cNvSpPr/>
+            <p:nvPr/>
+          </p:nvSpPr>
+          <p:spPr>
+            <a:xfrm>
+              <a:off x="8829637" y="1515280"/>
+              <a:ext cx="2376264" cy="2016224"/>
+            </a:xfrm>
+            <a:prstGeom prst="rect">
+              <a:avLst/>
+            </a:prstGeom>
+            <a:ln/>
+          </p:spPr>
+          <p:style>
+            <a:lnRef idx="2">
+              <a:schemeClr val="accent5">
+                <a:shade val="50000"/>
+              </a:schemeClr>
+            </a:lnRef>
+            <a:fillRef idx="1">
+              <a:schemeClr val="accent5"/>
+            </a:fillRef>
+            <a:effectRef idx="0">
+              <a:schemeClr val="accent5"/>
+            </a:effectRef>
+            <a:fontRef idx="minor">
+              <a:schemeClr val="lt1"/>
+            </a:fontRef>
+          </p:style>
+          <p:txBody>
+            <a:bodyPr rtlCol="0" anchor="ctr"/>
+            <a:lstStyle/>
+            <a:p>
+              <a:pPr algn="ctr"/>
+              <a:endParaRPr lang="pt-BR" sz="1600">
+                <a:solidFill>
+                  <a:prstClr val="white"/>
+                </a:solidFill>
+                <a:latin typeface="Calibri"/>
+              </a:endParaRPr>
+            </a:p>
+          </p:txBody>
+        </p:sp>
+        <p:sp>
+          <p:nvSpPr>
+            <p:cNvPr id="91" name="Retângulo 90">
+              <a:extLst>
+                <a:ext uri="{FF2B5EF4-FFF2-40B4-BE49-F238E27FC236}">
+                  <a16:creationId xmlns:a16="http://schemas.microsoft.com/office/drawing/2014/main" id="{288B414D-5D6A-4B1F-AEC6-931B25D9821B}"/>
+                </a:ext>
+              </a:extLst>
+            </p:cNvPr>
+            <p:cNvSpPr/>
+            <p:nvPr/>
+          </p:nvSpPr>
+          <p:spPr>
+            <a:xfrm>
+              <a:off x="8788108" y="1583056"/>
+              <a:ext cx="2566458" cy="1120431"/>
+            </a:xfrm>
+            <a:prstGeom prst="rect">
+              <a:avLst/>
+            </a:prstGeom>
+          </p:spPr>
+          <p:txBody>
+            <a:bodyPr wrap="square">
+              <a:spAutoFit/>
+            </a:bodyPr>
+            <a:lstStyle/>
+            <a:p>
+              <a:pPr lvl="0" algn="ctr">
+                <a:defRPr/>
+              </a:pPr>
+              <a:r>
+                <a:rPr lang="pt-BR" sz="1800" b="1" dirty="0">
+                  <a:solidFill>
+                    <a:prstClr val="white"/>
+                  </a:solidFill>
+                </a:rPr>
+                <a:t>Cliente </a:t>
+              </a:r>
+              <a:r>
+                <a:rPr lang="pt-BR" sz="1800" b="1" dirty="0" err="1">
+                  <a:solidFill>
+                    <a:prstClr val="white"/>
+                  </a:solidFill>
+                </a:rPr>
+                <a:t>Controller</a:t>
+              </a:r>
+              <a:endParaRPr lang="pt-BR" sz="1800" b="1" dirty="0">
+                <a:solidFill>
+                  <a:prstClr val="white"/>
+                </a:solidFill>
+              </a:endParaRPr>
+            </a:p>
+            <a:p>
+              <a:pPr lvl="0" algn="ctr">
+                <a:defRPr/>
+              </a:pPr>
+              <a:r>
+                <a:rPr lang="pt-BR" sz="1400" dirty="0">
+                  <a:solidFill>
+                    <a:prstClr val="white"/>
+                  </a:solidFill>
+                </a:rPr>
+                <a:t>[</a:t>
+              </a:r>
+              <a:r>
+                <a:rPr lang="pt-BR" sz="1400" dirty="0" err="1">
+                  <a:solidFill>
+                    <a:prstClr val="white"/>
+                  </a:solidFill>
+                </a:rPr>
+                <a:t>Component</a:t>
+              </a:r>
+              <a:r>
+                <a:rPr lang="pt-BR" sz="1400" dirty="0">
+                  <a:solidFill>
+                    <a:prstClr val="white"/>
+                  </a:solidFill>
+                </a:rPr>
+                <a:t>: Spring MVC </a:t>
+              </a:r>
+              <a:r>
+                <a:rPr lang="pt-BR" sz="1400" dirty="0" err="1">
+                  <a:solidFill>
+                    <a:prstClr val="white"/>
+                  </a:solidFill>
+                </a:rPr>
+                <a:t>Rest</a:t>
+              </a:r>
+              <a:r>
+                <a:rPr lang="pt-BR" sz="1400" dirty="0">
+                  <a:solidFill>
+                    <a:prstClr val="white"/>
+                  </a:solidFill>
+                </a:rPr>
+                <a:t> </a:t>
+              </a:r>
+              <a:r>
+                <a:rPr lang="pt-BR" sz="1400" dirty="0" err="1">
+                  <a:solidFill>
+                    <a:prstClr val="white"/>
+                  </a:solidFill>
+                </a:rPr>
+                <a:t>Controller</a:t>
+              </a:r>
+              <a:r>
+                <a:rPr lang="pt-BR" sz="1400" dirty="0">
+                  <a:solidFill>
+                    <a:prstClr val="white"/>
+                  </a:solidFill>
+                </a:rPr>
+                <a:t>]</a:t>
+              </a:r>
+            </a:p>
+          </p:txBody>
+        </p:sp>
+        <p:sp>
+          <p:nvSpPr>
+            <p:cNvPr id="92" name="Retângulo 20">
+              <a:extLst>
+                <a:ext uri="{FF2B5EF4-FFF2-40B4-BE49-F238E27FC236}">
+                  <a16:creationId xmlns:a16="http://schemas.microsoft.com/office/drawing/2014/main" id="{F53FF2C7-85BB-4F9F-A0E1-036D27E63E6D}"/>
+                </a:ext>
+              </a:extLst>
+            </p:cNvPr>
+            <p:cNvSpPr/>
+            <p:nvPr/>
+          </p:nvSpPr>
+          <p:spPr>
+            <a:xfrm>
+              <a:off x="8860115" y="2714711"/>
+              <a:ext cx="2338917" cy="732589"/>
+            </a:xfrm>
+            <a:prstGeom prst="rect">
+              <a:avLst/>
+            </a:prstGeom>
+          </p:spPr>
+          <p:txBody>
+            <a:bodyPr wrap="square">
+              <a:spAutoFit/>
+            </a:bodyPr>
+            <a:lstStyle/>
+            <a:p>
+              <a:pPr lvl="0" algn="ctr">
+                <a:defRPr/>
+              </a:pPr>
+              <a:r>
+                <a:rPr lang="pt-BR" sz="1400" dirty="0">
+                  <a:solidFill>
+                    <a:prstClr val="white"/>
+                  </a:solidFill>
+                </a:rPr>
+                <a:t>Cadastra e lista os clientes cadastrados</a:t>
+              </a:r>
+              <a:endParaRPr lang="pt-BR" sz="1100" dirty="0">
+                <a:solidFill>
+                  <a:prstClr val="white"/>
+                </a:solidFill>
+              </a:endParaRPr>
+            </a:p>
+          </p:txBody>
+        </p:sp>
+      </p:grpSp>
+      <p:grpSp>
+        <p:nvGrpSpPr>
+          <p:cNvPr id="118" name="Group 38">
+            <a:extLst>
+              <a:ext uri="{FF2B5EF4-FFF2-40B4-BE49-F238E27FC236}">
+                <a16:creationId xmlns:a16="http://schemas.microsoft.com/office/drawing/2014/main" id="{34BE92CC-7EF5-4A48-81E4-3276F6679A73}"/>
+              </a:ext>
+            </a:extLst>
+          </p:cNvPr>
+          <p:cNvGrpSpPr/>
+          <p:nvPr/>
+        </p:nvGrpSpPr>
+        <p:grpSpPr>
+          <a:xfrm>
+            <a:off x="8665691" y="3420751"/>
+            <a:ext cx="2118784" cy="1440000"/>
+            <a:chOff x="8813686" y="1524475"/>
+            <a:chExt cx="2588120" cy="2016224"/>
+          </a:xfrm>
+        </p:grpSpPr>
+        <p:sp>
+          <p:nvSpPr>
+            <p:cNvPr id="119" name="Retângulo 118">
+              <a:extLst>
+                <a:ext uri="{FF2B5EF4-FFF2-40B4-BE49-F238E27FC236}">
+                  <a16:creationId xmlns:a16="http://schemas.microsoft.com/office/drawing/2014/main" id="{B03554D8-2316-438C-A347-A4E9F8381E79}"/>
+                </a:ext>
+              </a:extLst>
+            </p:cNvPr>
+            <p:cNvSpPr/>
+            <p:nvPr/>
+          </p:nvSpPr>
+          <p:spPr>
+            <a:xfrm>
+              <a:off x="8902687" y="1524475"/>
+              <a:ext cx="2376264" cy="2016224"/>
+            </a:xfrm>
+            <a:prstGeom prst="rect">
+              <a:avLst/>
+            </a:prstGeom>
+            <a:ln/>
+          </p:spPr>
+          <p:style>
+            <a:lnRef idx="2">
+              <a:schemeClr val="accent5">
+                <a:shade val="50000"/>
+              </a:schemeClr>
+            </a:lnRef>
+            <a:fillRef idx="1">
+              <a:schemeClr val="accent5"/>
+            </a:fillRef>
+            <a:effectRef idx="0">
+              <a:schemeClr val="accent5"/>
+            </a:effectRef>
+            <a:fontRef idx="minor">
+              <a:schemeClr val="lt1"/>
+            </a:fontRef>
+          </p:style>
+          <p:txBody>
+            <a:bodyPr rtlCol="0" anchor="ctr"/>
+            <a:lstStyle/>
+            <a:p>
+              <a:pPr algn="ctr"/>
+              <a:endParaRPr lang="pt-BR" sz="1600">
+                <a:solidFill>
+                  <a:prstClr val="white"/>
+                </a:solidFill>
+                <a:latin typeface="Calibri"/>
+              </a:endParaRPr>
+            </a:p>
+          </p:txBody>
+        </p:sp>
+        <p:sp>
+          <p:nvSpPr>
+            <p:cNvPr id="120" name="Retângulo 119">
+              <a:extLst>
+                <a:ext uri="{FF2B5EF4-FFF2-40B4-BE49-F238E27FC236}">
+                  <a16:creationId xmlns:a16="http://schemas.microsoft.com/office/drawing/2014/main" id="{30DF4EA6-9B4B-4AC9-91E7-626950DA859B}"/>
+                </a:ext>
+              </a:extLst>
+            </p:cNvPr>
+            <p:cNvSpPr/>
+            <p:nvPr/>
+          </p:nvSpPr>
+          <p:spPr>
+            <a:xfrm>
+              <a:off x="8835348" y="1583056"/>
+              <a:ext cx="2566458" cy="1120431"/>
+            </a:xfrm>
+            <a:prstGeom prst="rect">
+              <a:avLst/>
+            </a:prstGeom>
+          </p:spPr>
+          <p:txBody>
+            <a:bodyPr wrap="square">
+              <a:spAutoFit/>
+            </a:bodyPr>
+            <a:lstStyle/>
+            <a:p>
+              <a:pPr lvl="0" algn="ctr">
+                <a:defRPr/>
+              </a:pPr>
+              <a:r>
+                <a:rPr lang="pt-BR" sz="1800" b="1" dirty="0" err="1">
+                  <a:solidFill>
+                    <a:prstClr val="white"/>
+                  </a:solidFill>
+                </a:rPr>
+                <a:t>Usuario</a:t>
+              </a:r>
+              <a:r>
+                <a:rPr lang="pt-BR" sz="1800" b="1" dirty="0">
+                  <a:solidFill>
+                    <a:prstClr val="white"/>
+                  </a:solidFill>
+                </a:rPr>
+                <a:t> </a:t>
+              </a:r>
+              <a:r>
+                <a:rPr lang="pt-BR" sz="1800" b="1" dirty="0" err="1">
+                  <a:solidFill>
+                    <a:prstClr val="white"/>
+                  </a:solidFill>
+                </a:rPr>
+                <a:t>Controller</a:t>
+              </a:r>
+              <a:endParaRPr lang="pt-BR" sz="1800" b="1" dirty="0">
+                <a:solidFill>
+                  <a:prstClr val="white"/>
+                </a:solidFill>
+              </a:endParaRPr>
+            </a:p>
+            <a:p>
+              <a:pPr lvl="0" algn="ctr">
+                <a:defRPr/>
+              </a:pPr>
+              <a:r>
+                <a:rPr lang="pt-BR" sz="1400" dirty="0">
+                  <a:solidFill>
+                    <a:prstClr val="white"/>
+                  </a:solidFill>
+                </a:rPr>
+                <a:t>[</a:t>
+              </a:r>
+              <a:r>
+                <a:rPr lang="pt-BR" sz="1400" dirty="0" err="1">
+                  <a:solidFill>
+                    <a:prstClr val="white"/>
+                  </a:solidFill>
+                </a:rPr>
+                <a:t>Component</a:t>
+              </a:r>
+              <a:r>
+                <a:rPr lang="pt-BR" sz="1400" dirty="0">
+                  <a:solidFill>
+                    <a:prstClr val="white"/>
+                  </a:solidFill>
+                </a:rPr>
+                <a:t>: Spring MVC </a:t>
+              </a:r>
+              <a:r>
+                <a:rPr lang="pt-BR" sz="1400" dirty="0" err="1">
+                  <a:solidFill>
+                    <a:prstClr val="white"/>
+                  </a:solidFill>
+                </a:rPr>
+                <a:t>Rest</a:t>
+              </a:r>
+              <a:r>
+                <a:rPr lang="pt-BR" sz="1400" dirty="0">
+                  <a:solidFill>
+                    <a:prstClr val="white"/>
+                  </a:solidFill>
+                </a:rPr>
+                <a:t> </a:t>
+              </a:r>
+              <a:r>
+                <a:rPr lang="pt-BR" sz="1400" dirty="0" err="1">
+                  <a:solidFill>
+                    <a:prstClr val="white"/>
+                  </a:solidFill>
+                </a:rPr>
+                <a:t>Controller</a:t>
+              </a:r>
+              <a:r>
+                <a:rPr lang="pt-BR" sz="1400" dirty="0">
+                  <a:solidFill>
+                    <a:prstClr val="white"/>
+                  </a:solidFill>
+                </a:rPr>
+                <a:t>]</a:t>
+              </a:r>
+            </a:p>
+          </p:txBody>
+        </p:sp>
+        <p:sp>
+          <p:nvSpPr>
+            <p:cNvPr id="121" name="Retângulo 20">
+              <a:extLst>
+                <a:ext uri="{FF2B5EF4-FFF2-40B4-BE49-F238E27FC236}">
+                  <a16:creationId xmlns:a16="http://schemas.microsoft.com/office/drawing/2014/main" id="{10D028BC-DB3B-4D5E-B113-B4F7BBFB690B}"/>
+                </a:ext>
+              </a:extLst>
+            </p:cNvPr>
+            <p:cNvSpPr/>
+            <p:nvPr/>
+          </p:nvSpPr>
+          <p:spPr>
+            <a:xfrm>
+              <a:off x="8813686" y="2714711"/>
+              <a:ext cx="2566458" cy="732589"/>
+            </a:xfrm>
+            <a:prstGeom prst="rect">
+              <a:avLst/>
+            </a:prstGeom>
+          </p:spPr>
+          <p:txBody>
+            <a:bodyPr wrap="square">
+              <a:spAutoFit/>
+            </a:bodyPr>
+            <a:lstStyle/>
+            <a:p>
+              <a:pPr lvl="0" algn="ctr">
+                <a:defRPr/>
+              </a:pPr>
+              <a:r>
+                <a:rPr lang="pt-BR" sz="1400" dirty="0">
+                  <a:solidFill>
+                    <a:prstClr val="white"/>
+                  </a:solidFill>
+                </a:rPr>
+                <a:t>Cadastra e realiza login do usuário na aplicação</a:t>
+              </a:r>
+              <a:endParaRPr lang="pt-BR" sz="1100" dirty="0">
+                <a:solidFill>
+                  <a:prstClr val="white"/>
+                </a:solidFill>
+              </a:endParaRPr>
+            </a:p>
+          </p:txBody>
+        </p:sp>
+      </p:grpSp>
+      <p:cxnSp>
+        <p:nvCxnSpPr>
+          <p:cNvPr id="126" name="Conector de Seta Reta 107">
+            <a:extLst>
+              <a:ext uri="{FF2B5EF4-FFF2-40B4-BE49-F238E27FC236}">
+                <a16:creationId xmlns:a16="http://schemas.microsoft.com/office/drawing/2014/main" id="{E8C3227A-81A1-47FE-9E11-99DFB6D0E004}"/>
+              </a:ext>
+            </a:extLst>
+          </p:cNvPr>
+          <p:cNvCxnSpPr>
+            <a:cxnSpLocks/>
+            <a:stCxn id="90" idx="0"/>
+          </p:cNvCxnSpPr>
+          <p:nvPr/>
+        </p:nvCxnSpPr>
+        <p:spPr>
+          <a:xfrm flipV="1">
+            <a:off x="4972759" y="2850823"/>
+            <a:ext cx="7732" cy="569928"/>
+          </a:xfrm>
+          <a:prstGeom prst="straightConnector1">
+            <a:avLst/>
+          </a:prstGeom>
+          <a:ln w="19050">
+            <a:solidFill>
+              <a:schemeClr val="accent5">
+                <a:lumMod val="75000"/>
+              </a:schemeClr>
+            </a:solidFill>
+            <a:prstDash val="sysDash"/>
+            <a:headEnd type="none" w="lg" len="lg"/>
+            <a:tailEnd type="triangle" w="lg" len="lg"/>
+          </a:ln>
+        </p:spPr>
+        <p:style>
+          <a:lnRef idx="1">
+            <a:schemeClr val="accent1"/>
+          </a:lnRef>
+          <a:fillRef idx="0">
+            <a:schemeClr val="accent1"/>
+          </a:fillRef>
+          <a:effectRef idx="0">
+            <a:schemeClr val="accent1"/>
+          </a:effectRef>
+          <a:fontRef idx="minor">
+            <a:schemeClr val="tx1"/>
+          </a:fontRef>
+        </p:style>
+      </p:cxnSp>
+      <p:cxnSp>
+        <p:nvCxnSpPr>
+          <p:cNvPr id="127" name="Conector de Seta Reta 107">
+            <a:extLst>
+              <a:ext uri="{FF2B5EF4-FFF2-40B4-BE49-F238E27FC236}">
+                <a16:creationId xmlns:a16="http://schemas.microsoft.com/office/drawing/2014/main" id="{7934C54C-312B-46E4-A9F4-F64BBE41D87A}"/>
+              </a:ext>
+            </a:extLst>
+          </p:cNvPr>
+          <p:cNvCxnSpPr>
+            <a:cxnSpLocks/>
+            <a:stCxn id="119" idx="0"/>
+            <a:endCxn id="58" idx="3"/>
+          </p:cNvCxnSpPr>
+          <p:nvPr/>
+        </p:nvCxnSpPr>
+        <p:spPr>
+          <a:xfrm flipH="1" flipV="1">
+            <a:off x="5981893" y="2136352"/>
+            <a:ext cx="3729332" cy="1284399"/>
+          </a:xfrm>
+          <a:prstGeom prst="straightConnector1">
+            <a:avLst/>
+          </a:prstGeom>
+          <a:ln w="19050">
+            <a:solidFill>
+              <a:schemeClr val="accent5">
+                <a:lumMod val="75000"/>
+              </a:schemeClr>
+            </a:solidFill>
+            <a:prstDash val="sysDash"/>
+            <a:headEnd type="none" w="lg" len="lg"/>
+            <a:tailEnd type="triangle" w="lg" len="lg"/>
+          </a:ln>
+        </p:spPr>
+        <p:style>
+          <a:lnRef idx="1">
+            <a:schemeClr val="accent1"/>
+          </a:lnRef>
+          <a:fillRef idx="0">
+            <a:schemeClr val="accent1"/>
+          </a:fillRef>
+          <a:effectRef idx="0">
+            <a:schemeClr val="accent1"/>
+          </a:effectRef>
+          <a:fontRef idx="minor">
+            <a:schemeClr val="tx1"/>
+          </a:fontRef>
+        </p:style>
+      </p:cxnSp>
+      <p:cxnSp>
+        <p:nvCxnSpPr>
+          <p:cNvPr id="129" name="Conector de Seta Reta 107">
+            <a:extLst>
+              <a:ext uri="{FF2B5EF4-FFF2-40B4-BE49-F238E27FC236}">
+                <a16:creationId xmlns:a16="http://schemas.microsoft.com/office/drawing/2014/main" id="{2F1DBE39-0E52-4C7A-9AF7-6A2786056A63}"/>
+              </a:ext>
+            </a:extLst>
+          </p:cNvPr>
+          <p:cNvCxnSpPr>
+            <a:cxnSpLocks/>
+            <a:stCxn id="31" idx="0"/>
+            <a:endCxn id="90" idx="2"/>
+          </p:cNvCxnSpPr>
+          <p:nvPr/>
+        </p:nvCxnSpPr>
+        <p:spPr>
+          <a:xfrm flipV="1">
+            <a:off x="4829843" y="4860751"/>
+            <a:ext cx="142916" cy="753867"/>
+          </a:xfrm>
+          <a:prstGeom prst="straightConnector1">
+            <a:avLst/>
+          </a:prstGeom>
+          <a:ln w="19050">
+            <a:solidFill>
+              <a:schemeClr val="accent5">
+                <a:lumMod val="75000"/>
+              </a:schemeClr>
+            </a:solidFill>
+            <a:prstDash val="sysDash"/>
+            <a:headEnd type="none" w="lg" len="lg"/>
+            <a:tailEnd type="triangle" w="lg" len="lg"/>
+          </a:ln>
+        </p:spPr>
+        <p:style>
+          <a:lnRef idx="1">
+            <a:schemeClr val="accent1"/>
+          </a:lnRef>
+          <a:fillRef idx="0">
+            <a:schemeClr val="accent1"/>
+          </a:fillRef>
+          <a:effectRef idx="0">
+            <a:schemeClr val="accent1"/>
+          </a:effectRef>
+          <a:fontRef idx="minor">
+            <a:schemeClr val="tx1"/>
+          </a:fontRef>
+        </p:style>
+      </p:cxnSp>
+      <p:cxnSp>
+        <p:nvCxnSpPr>
+          <p:cNvPr id="130" name="Conector de Seta Reta 107">
+            <a:extLst>
+              <a:ext uri="{FF2B5EF4-FFF2-40B4-BE49-F238E27FC236}">
+                <a16:creationId xmlns:a16="http://schemas.microsoft.com/office/drawing/2014/main" id="{9978E44F-CFDB-4D15-A66D-D3F07A2619D5}"/>
+              </a:ext>
+            </a:extLst>
+          </p:cNvPr>
+          <p:cNvCxnSpPr>
+            <a:cxnSpLocks/>
+          </p:cNvCxnSpPr>
+          <p:nvPr/>
+        </p:nvCxnSpPr>
+        <p:spPr>
+          <a:xfrm flipH="1" flipV="1">
+            <a:off x="7729587" y="4800612"/>
+            <a:ext cx="216024" cy="782467"/>
+          </a:xfrm>
+          <a:prstGeom prst="straightConnector1">
+            <a:avLst/>
+          </a:prstGeom>
+          <a:ln w="19050">
+            <a:solidFill>
+              <a:schemeClr val="accent5">
+                <a:lumMod val="75000"/>
+              </a:schemeClr>
+            </a:solidFill>
+            <a:prstDash val="sysDash"/>
+            <a:headEnd type="none" w="lg" len="lg"/>
+            <a:tailEnd type="triangle" w="lg" len="lg"/>
+          </a:ln>
+        </p:spPr>
+        <p:style>
+          <a:lnRef idx="1">
+            <a:schemeClr val="accent1"/>
+          </a:lnRef>
+          <a:fillRef idx="0">
+            <a:schemeClr val="accent1"/>
+          </a:fillRef>
+          <a:effectRef idx="0">
+            <a:schemeClr val="accent1"/>
+          </a:effectRef>
+          <a:fontRef idx="minor">
+            <a:schemeClr val="tx1"/>
+          </a:fontRef>
+        </p:style>
+      </p:cxnSp>
+      <p:cxnSp>
+        <p:nvCxnSpPr>
+          <p:cNvPr id="131" name="Conector de Seta Reta 107">
+            <a:extLst>
+              <a:ext uri="{FF2B5EF4-FFF2-40B4-BE49-F238E27FC236}">
+                <a16:creationId xmlns:a16="http://schemas.microsoft.com/office/drawing/2014/main" id="{45027C2E-6250-4F90-87EB-D1C9B6ADB3C9}"/>
+              </a:ext>
+            </a:extLst>
+          </p:cNvPr>
+          <p:cNvCxnSpPr>
+            <a:cxnSpLocks/>
+          </p:cNvCxnSpPr>
+          <p:nvPr/>
+        </p:nvCxnSpPr>
+        <p:spPr>
+          <a:xfrm flipV="1">
+            <a:off x="8022142" y="4871174"/>
+            <a:ext cx="1689083" cy="709657"/>
+          </a:xfrm>
+          <a:prstGeom prst="straightConnector1">
+            <a:avLst/>
+          </a:prstGeom>
+          <a:ln w="19050">
+            <a:solidFill>
+              <a:schemeClr val="accent5">
+                <a:lumMod val="75000"/>
+              </a:schemeClr>
+            </a:solidFill>
+            <a:prstDash val="sysDash"/>
+            <a:headEnd type="none" w="lg" len="lg"/>
+            <a:tailEnd type="triangle" w="lg" len="lg"/>
+          </a:ln>
+        </p:spPr>
+        <p:style>
+          <a:lnRef idx="1">
+            <a:schemeClr val="accent1"/>
+          </a:lnRef>
+          <a:fillRef idx="0">
+            <a:schemeClr val="accent1"/>
+          </a:fillRef>
+          <a:effectRef idx="0">
+            <a:schemeClr val="accent1"/>
+          </a:effectRef>
+          <a:fontRef idx="minor">
+            <a:schemeClr val="tx1"/>
+          </a:fontRef>
+        </p:style>
+      </p:cxnSp>
+      <p:cxnSp>
+        <p:nvCxnSpPr>
+          <p:cNvPr id="132" name="Conector de Seta Reta 107">
+            <a:extLst>
+              <a:ext uri="{FF2B5EF4-FFF2-40B4-BE49-F238E27FC236}">
+                <a16:creationId xmlns:a16="http://schemas.microsoft.com/office/drawing/2014/main" id="{D986F568-286F-4E16-AB86-D12FED534A79}"/>
+              </a:ext>
+            </a:extLst>
+          </p:cNvPr>
+          <p:cNvCxnSpPr>
+            <a:cxnSpLocks/>
+            <a:endCxn id="90" idx="2"/>
+          </p:cNvCxnSpPr>
+          <p:nvPr/>
+        </p:nvCxnSpPr>
+        <p:spPr>
+          <a:xfrm flipH="1" flipV="1">
+            <a:off x="4972759" y="4860751"/>
+            <a:ext cx="3007810" cy="759462"/>
+          </a:xfrm>
+          <a:prstGeom prst="straightConnector1">
+            <a:avLst/>
+          </a:prstGeom>
+          <a:ln w="19050">
+            <a:solidFill>
+              <a:schemeClr val="accent5">
+                <a:lumMod val="75000"/>
+              </a:schemeClr>
+            </a:solidFill>
+            <a:prstDash val="sysDash"/>
+            <a:headEnd type="none" w="lg" len="lg"/>
+            <a:tailEnd type="triangle" w="lg" len="lg"/>
+          </a:ln>
+        </p:spPr>
+        <p:style>
+          <a:lnRef idx="1">
+            <a:schemeClr val="accent1"/>
+          </a:lnRef>
+          <a:fillRef idx="0">
+            <a:schemeClr val="accent1"/>
+          </a:fillRef>
+          <a:effectRef idx="0">
+            <a:schemeClr val="accent1"/>
+          </a:effectRef>
+          <a:fontRef idx="minor">
+            <a:schemeClr val="tx1"/>
+          </a:fontRef>
+        </p:style>
+      </p:cxnSp>
+      <p:sp>
+        <p:nvSpPr>
+          <p:cNvPr id="133" name="Retângulo 132">
+            <a:extLst>
+              <a:ext uri="{FF2B5EF4-FFF2-40B4-BE49-F238E27FC236}">
+                <a16:creationId xmlns:a16="http://schemas.microsoft.com/office/drawing/2014/main" id="{7765593F-B090-46C0-81FD-80101683C0CD}"/>
+              </a:ext>
+            </a:extLst>
+          </p:cNvPr>
+          <p:cNvSpPr/>
+          <p:nvPr/>
+        </p:nvSpPr>
+        <p:spPr>
+          <a:xfrm>
+            <a:off x="8362229" y="4985022"/>
+            <a:ext cx="1001493" cy="307777"/>
+          </a:xfrm>
+          <a:prstGeom prst="rect">
+            <a:avLst/>
+          </a:prstGeom>
+        </p:spPr>
+        <p:txBody>
+          <a:bodyPr wrap="none">
+            <a:spAutoFit/>
+          </a:bodyPr>
+          <a:lstStyle/>
+          <a:p>
+            <a:r>
+              <a:rPr lang="pt-BR" sz="1400" b="1"/>
+              <a:t>HTTP/REST</a:t>
+            </a:r>
+          </a:p>
+        </p:txBody>
+      </p:sp>
+      <p:grpSp>
+        <p:nvGrpSpPr>
+          <p:cNvPr id="135" name="Group 36">
+            <a:extLst>
+              <a:ext uri="{FF2B5EF4-FFF2-40B4-BE49-F238E27FC236}">
+                <a16:creationId xmlns:a16="http://schemas.microsoft.com/office/drawing/2014/main" id="{B7430326-65D4-4D70-A1C5-05F48B10C866}"/>
+              </a:ext>
+            </a:extLst>
+          </p:cNvPr>
+          <p:cNvGrpSpPr/>
+          <p:nvPr/>
+        </p:nvGrpSpPr>
+        <p:grpSpPr>
+          <a:xfrm>
+            <a:off x="6606229" y="5614618"/>
+            <a:ext cx="2707534" cy="1852063"/>
+            <a:chOff x="7014179" y="4654462"/>
+            <a:chExt cx="2675302" cy="2113988"/>
+          </a:xfrm>
+        </p:grpSpPr>
+        <p:grpSp>
+          <p:nvGrpSpPr>
+            <p:cNvPr id="136" name="Group 22">
+              <a:extLst>
+                <a:ext uri="{FF2B5EF4-FFF2-40B4-BE49-F238E27FC236}">
+                  <a16:creationId xmlns:a16="http://schemas.microsoft.com/office/drawing/2014/main" id="{3DBA05EC-4AC6-4628-BE7D-AC2F85D7C159}"/>
+                </a:ext>
+              </a:extLst>
+            </p:cNvPr>
+            <p:cNvGrpSpPr/>
+            <p:nvPr/>
+          </p:nvGrpSpPr>
+          <p:grpSpPr>
+            <a:xfrm>
+              <a:off x="7149338" y="4654462"/>
+              <a:ext cx="2463283" cy="2016225"/>
+              <a:chOff x="8392958" y="3891083"/>
+              <a:chExt cx="3276202" cy="2212133"/>
+            </a:xfrm>
+          </p:grpSpPr>
+          <p:sp>
+            <p:nvSpPr>
+              <p:cNvPr id="139" name="Retângulo 6">
+                <a:extLst>
+                  <a:ext uri="{FF2B5EF4-FFF2-40B4-BE49-F238E27FC236}">
+                    <a16:creationId xmlns:a16="http://schemas.microsoft.com/office/drawing/2014/main" id="{7D8600E2-413A-40FD-B87C-2A335615AA94}"/>
+                  </a:ext>
+                </a:extLst>
+              </p:cNvPr>
+              <p:cNvSpPr/>
+              <p:nvPr/>
+            </p:nvSpPr>
+            <p:spPr>
+              <a:xfrm>
+                <a:off x="8392958" y="3891083"/>
+                <a:ext cx="3276202" cy="2212133"/>
+              </a:xfrm>
+              <a:prstGeom prst="rect">
+                <a:avLst/>
+              </a:prstGeom>
+              <a:solidFill>
+                <a:srgbClr val="32B9CD"/>
+              </a:solidFill>
+              <a:ln>
+                <a:solidFill>
+                  <a:schemeClr val="accent5">
+                    <a:lumMod val="75000"/>
+                  </a:schemeClr>
+                </a:solidFill>
+              </a:ln>
+            </p:spPr>
+            <p:style>
+              <a:lnRef idx="2">
+                <a:schemeClr val="accent1">
+                  <a:shade val="50000"/>
+                </a:schemeClr>
+              </a:lnRef>
+              <a:fillRef idx="1">
+                <a:schemeClr val="accent1"/>
+              </a:fillRef>
+              <a:effectRef idx="0">
+                <a:schemeClr val="accent1"/>
+              </a:effectRef>
+              <a:fontRef idx="minor">
+                <a:schemeClr val="lt1"/>
+              </a:fontRef>
+            </p:style>
+            <p:txBody>
+              <a:bodyPr rtlCol="0" anchor="ctr"/>
+              <a:lstStyle/>
+              <a:p>
+                <a:pPr algn="ctr"/>
+                <a:endParaRPr lang="pt-BR">
+                  <a:solidFill>
+                    <a:prstClr val="white"/>
+                  </a:solidFill>
+                  <a:latin typeface="Calibri"/>
+                </a:endParaRPr>
+              </a:p>
+            </p:txBody>
+          </p:sp>
+          <p:sp>
+            <p:nvSpPr>
+              <p:cNvPr id="140" name="Retângulo 6">
+                <a:extLst>
+                  <a:ext uri="{FF2B5EF4-FFF2-40B4-BE49-F238E27FC236}">
+                    <a16:creationId xmlns:a16="http://schemas.microsoft.com/office/drawing/2014/main" id="{DF9D8653-1050-4E43-8439-9F43C5F848CD}"/>
+                  </a:ext>
+                </a:extLst>
+              </p:cNvPr>
+              <p:cNvSpPr/>
+              <p:nvPr/>
+            </p:nvSpPr>
+            <p:spPr>
+              <a:xfrm>
+                <a:off x="8464949" y="3959113"/>
+                <a:ext cx="2577005" cy="226901"/>
+              </a:xfrm>
+              <a:prstGeom prst="rect">
+                <a:avLst/>
+              </a:prstGeom>
+              <a:noFill/>
+              <a:ln>
+                <a:solidFill>
+                  <a:schemeClr val="accent5">
+                    <a:lumMod val="75000"/>
+                  </a:schemeClr>
+                </a:solidFill>
+              </a:ln>
+            </p:spPr>
+            <p:style>
+              <a:lnRef idx="2">
+                <a:schemeClr val="accent1">
+                  <a:shade val="50000"/>
+                </a:schemeClr>
+              </a:lnRef>
+              <a:fillRef idx="1">
+                <a:schemeClr val="accent1"/>
+              </a:fillRef>
+              <a:effectRef idx="0">
+                <a:schemeClr val="accent1"/>
+              </a:effectRef>
+              <a:fontRef idx="minor">
+                <a:schemeClr val="lt1"/>
+              </a:fontRef>
+            </p:style>
+            <p:txBody>
+              <a:bodyPr rtlCol="0" anchor="ctr"/>
+              <a:lstStyle/>
+              <a:p>
+                <a:pPr algn="ctr"/>
+                <a:endParaRPr lang="pt-BR">
+                  <a:solidFill>
+                    <a:prstClr val="white"/>
+                  </a:solidFill>
+                  <a:latin typeface="Calibri"/>
+                </a:endParaRPr>
+              </a:p>
+            </p:txBody>
+          </p:sp>
+          <p:sp>
+            <p:nvSpPr>
+              <p:cNvPr id="141" name="Multiply 18">
+                <a:extLst>
+                  <a:ext uri="{FF2B5EF4-FFF2-40B4-BE49-F238E27FC236}">
+                    <a16:creationId xmlns:a16="http://schemas.microsoft.com/office/drawing/2014/main" id="{44D62C31-1914-4749-9593-A0BCFBF6BF97}"/>
+                  </a:ext>
+                </a:extLst>
+              </p:cNvPr>
+              <p:cNvSpPr/>
+              <p:nvPr/>
+            </p:nvSpPr>
+            <p:spPr>
+              <a:xfrm>
+                <a:off x="11309204" y="3924647"/>
+                <a:ext cx="288032" cy="295831"/>
+              </a:xfrm>
+              <a:prstGeom prst="mathMultiply">
+                <a:avLst/>
+              </a:prstGeom>
+              <a:noFill/>
+              <a:ln>
+                <a:solidFill>
+                  <a:schemeClr val="accent5">
+                    <a:lumMod val="75000"/>
+                  </a:schemeClr>
+                </a:solidFill>
+              </a:ln>
+            </p:spPr>
+            <p:style>
+              <a:lnRef idx="2">
+                <a:schemeClr val="accent1">
+                  <a:shade val="50000"/>
+                </a:schemeClr>
+              </a:lnRef>
+              <a:fillRef idx="1">
+                <a:schemeClr val="accent1"/>
+              </a:fillRef>
+              <a:effectRef idx="0">
+                <a:schemeClr val="accent1"/>
+              </a:effectRef>
+              <a:fontRef idx="minor">
+                <a:schemeClr val="lt1"/>
+              </a:fontRef>
+            </p:style>
+            <p:txBody>
+              <a:bodyPr rtlCol="0" anchor="ctr"/>
+              <a:lstStyle/>
+              <a:p>
+                <a:pPr algn="ctr"/>
+                <a:endParaRPr lang="pt-BR"/>
+              </a:p>
+            </p:txBody>
+          </p:sp>
+          <p:sp>
+            <p:nvSpPr>
+              <p:cNvPr id="142" name="Circular Arrow 19">
+                <a:extLst>
+                  <a:ext uri="{FF2B5EF4-FFF2-40B4-BE49-F238E27FC236}">
+                    <a16:creationId xmlns:a16="http://schemas.microsoft.com/office/drawing/2014/main" id="{F5218C13-846B-47DA-84FF-561A9EAE035F}"/>
+                  </a:ext>
+                </a:extLst>
+              </p:cNvPr>
+              <p:cNvSpPr/>
+              <p:nvPr/>
+            </p:nvSpPr>
+            <p:spPr>
+              <a:xfrm rot="16500000">
+                <a:off x="11158829" y="3927941"/>
+                <a:ext cx="216000" cy="288000"/>
+              </a:xfrm>
+              <a:prstGeom prst="circularArrow">
+                <a:avLst/>
+              </a:prstGeom>
+              <a:noFill/>
+              <a:ln>
+                <a:solidFill>
+                  <a:schemeClr val="accent5">
+                    <a:lumMod val="75000"/>
+                  </a:schemeClr>
+                </a:solidFill>
+              </a:ln>
+            </p:spPr>
+            <p:style>
+              <a:lnRef idx="2">
+                <a:schemeClr val="accent1">
+                  <a:shade val="50000"/>
+                </a:schemeClr>
+              </a:lnRef>
+              <a:fillRef idx="1">
+                <a:schemeClr val="accent1"/>
+              </a:fillRef>
+              <a:effectRef idx="0">
+                <a:schemeClr val="accent1"/>
+              </a:effectRef>
+              <a:fontRef idx="minor">
+                <a:schemeClr val="lt1"/>
+              </a:fontRef>
+            </p:style>
+            <p:txBody>
+              <a:bodyPr rtlCol="0" anchor="ctr"/>
+              <a:lstStyle/>
+              <a:p>
+                <a:pPr algn="ctr"/>
+                <a:endParaRPr lang="pt-BR">
+                  <a:solidFill>
+                    <a:schemeClr val="tx1"/>
+                  </a:solidFill>
+                </a:endParaRPr>
+              </a:p>
+            </p:txBody>
+          </p:sp>
+        </p:grpSp>
+        <p:sp>
+          <p:nvSpPr>
+            <p:cNvPr id="137" name="Retângulo 20">
+              <a:extLst>
+                <a:ext uri="{FF2B5EF4-FFF2-40B4-BE49-F238E27FC236}">
+                  <a16:creationId xmlns:a16="http://schemas.microsoft.com/office/drawing/2014/main" id="{35061AC3-B772-4F8A-A020-79283BF2EF88}"/>
+                </a:ext>
+              </a:extLst>
+            </p:cNvPr>
+            <p:cNvSpPr/>
+            <p:nvPr/>
+          </p:nvSpPr>
+          <p:spPr>
+            <a:xfrm>
+              <a:off x="7014179" y="4995848"/>
+              <a:ext cx="2566458" cy="737737"/>
+            </a:xfrm>
+            <a:prstGeom prst="rect">
+              <a:avLst/>
+            </a:prstGeom>
+          </p:spPr>
+          <p:txBody>
+            <a:bodyPr wrap="square">
+              <a:spAutoFit/>
+            </a:bodyPr>
+            <a:lstStyle/>
+            <a:p>
+              <a:pPr lvl="0" algn="ctr">
+                <a:defRPr/>
+              </a:pPr>
+              <a:r>
+                <a:rPr lang="pt-BR" sz="2000" b="1" dirty="0" err="1">
+                  <a:solidFill>
+                    <a:prstClr val="white"/>
+                  </a:solidFill>
+                </a:rPr>
+                <a:t>ClientSide</a:t>
+              </a:r>
+              <a:r>
+                <a:rPr lang="pt-BR" sz="2000" b="1" dirty="0">
+                  <a:solidFill>
+                    <a:prstClr val="white"/>
+                  </a:solidFill>
+                </a:rPr>
+                <a:t> Web</a:t>
+              </a:r>
+            </a:p>
+            <a:p>
+              <a:pPr lvl="0" algn="ctr">
+                <a:defRPr/>
+              </a:pPr>
+              <a:r>
+                <a:rPr lang="pt-BR" sz="1600" dirty="0">
+                  <a:solidFill>
+                    <a:prstClr val="white"/>
+                  </a:solidFill>
+                </a:rPr>
+                <a:t>[Container: React]</a:t>
+              </a:r>
+            </a:p>
+          </p:txBody>
+        </p:sp>
+        <p:sp>
+          <p:nvSpPr>
+            <p:cNvPr id="138" name="Retângulo 20">
+              <a:extLst>
+                <a:ext uri="{FF2B5EF4-FFF2-40B4-BE49-F238E27FC236}">
+                  <a16:creationId xmlns:a16="http://schemas.microsoft.com/office/drawing/2014/main" id="{591DBD71-2751-4717-89D0-4BA653D10704}"/>
+                </a:ext>
+              </a:extLst>
+            </p:cNvPr>
+            <p:cNvSpPr/>
+            <p:nvPr/>
+          </p:nvSpPr>
+          <p:spPr>
+            <a:xfrm>
+              <a:off x="7123023" y="5819931"/>
+              <a:ext cx="2566458" cy="948519"/>
+            </a:xfrm>
+            <a:prstGeom prst="rect">
+              <a:avLst/>
+            </a:prstGeom>
+          </p:spPr>
+          <p:txBody>
+            <a:bodyPr wrap="square">
+              <a:spAutoFit/>
+            </a:bodyPr>
+            <a:lstStyle/>
+            <a:p>
+              <a:pPr lvl="0" algn="ctr">
+                <a:defRPr/>
+              </a:pPr>
+              <a:r>
+                <a:rPr lang="pt-BR" sz="1600" dirty="0">
+                  <a:solidFill>
+                    <a:prstClr val="white"/>
+                  </a:solidFill>
+                </a:rPr>
+                <a:t>Dashboard financeira, cadastro de clientes e veículos</a:t>
+              </a:r>
+              <a:endParaRPr lang="pt-BR" sz="1200" dirty="0">
+                <a:solidFill>
+                  <a:prstClr val="white"/>
+                </a:solidFill>
+              </a:endParaRPr>
+            </a:p>
+          </p:txBody>
+        </p:sp>
+      </p:grpSp>
+      <p:cxnSp>
+        <p:nvCxnSpPr>
+          <p:cNvPr id="143" name="Conector de Seta Reta 107">
+            <a:extLst>
+              <a:ext uri="{FF2B5EF4-FFF2-40B4-BE49-F238E27FC236}">
+                <a16:creationId xmlns:a16="http://schemas.microsoft.com/office/drawing/2014/main" id="{FE62C364-5F60-4299-8719-B65EE38B24BC}"/>
+              </a:ext>
+            </a:extLst>
+          </p:cNvPr>
+          <p:cNvCxnSpPr>
+            <a:cxnSpLocks/>
+            <a:stCxn id="31" idx="0"/>
+            <a:endCxn id="119" idx="2"/>
+          </p:cNvCxnSpPr>
+          <p:nvPr/>
+        </p:nvCxnSpPr>
+        <p:spPr>
+          <a:xfrm flipV="1">
+            <a:off x="4829843" y="4860751"/>
+            <a:ext cx="4881382" cy="753867"/>
+          </a:xfrm>
+          <a:prstGeom prst="straightConnector1">
+            <a:avLst/>
+          </a:prstGeom>
+          <a:ln w="19050">
+            <a:solidFill>
+              <a:schemeClr val="accent5">
+                <a:lumMod val="75000"/>
+              </a:schemeClr>
+            </a:solidFill>
+            <a:prstDash val="sysDash"/>
+            <a:headEnd type="none" w="lg" len="lg"/>
+            <a:tailEnd type="triangle" w="lg" len="lg"/>
+          </a:ln>
+        </p:spPr>
+        <p:style>
+          <a:lnRef idx="1">
+            <a:schemeClr val="accent1"/>
+          </a:lnRef>
+          <a:fillRef idx="0">
+            <a:schemeClr val="accent1"/>
+          </a:fillRef>
+          <a:effectRef idx="0">
+            <a:schemeClr val="accent1"/>
+          </a:effectRef>
+          <a:fontRef idx="minor">
+            <a:schemeClr val="tx1"/>
+          </a:fontRef>
+        </p:style>
+      </p:cxnSp>
+      <p:sp>
+        <p:nvSpPr>
+          <p:cNvPr id="144" name="Retângulo 143">
+            <a:extLst>
+              <a:ext uri="{FF2B5EF4-FFF2-40B4-BE49-F238E27FC236}">
+                <a16:creationId xmlns:a16="http://schemas.microsoft.com/office/drawing/2014/main" id="{327B4C43-4122-4A14-88C8-8D35299EF3E5}"/>
+              </a:ext>
+            </a:extLst>
+          </p:cNvPr>
+          <p:cNvSpPr/>
+          <p:nvPr/>
+        </p:nvSpPr>
+        <p:spPr>
+          <a:xfrm>
+            <a:off x="9424535" y="5642824"/>
+            <a:ext cx="3921676" cy="946119"/>
+          </a:xfrm>
+          <a:prstGeom prst="rect">
+            <a:avLst/>
+          </a:prstGeom>
+          <a:solidFill>
+            <a:srgbClr val="32B9CD"/>
+          </a:solidFill>
+        </p:spPr>
+        <p:style>
+          <a:lnRef idx="1">
+            <a:schemeClr val="accent3"/>
+          </a:lnRef>
+          <a:fillRef idx="3">
+            <a:schemeClr val="accent3"/>
+          </a:fillRef>
+          <a:effectRef idx="2">
+            <a:schemeClr val="accent3"/>
+          </a:effectRef>
+          <a:fontRef idx="minor">
+            <a:schemeClr val="lt1"/>
+          </a:fontRef>
+        </p:style>
+        <p:txBody>
+          <a:bodyPr rtlCol="0" anchor="ctr"/>
+          <a:lstStyle/>
+          <a:p>
+            <a:pPr algn="ctr"/>
+            <a:r>
+              <a:rPr lang="pt-BR" sz="1800" b="1">
+                <a:solidFill>
+                  <a:srgbClr val="272A30"/>
+                </a:solidFill>
+                <a:latin typeface="Exo 2" panose="00000500000000000000" pitchFamily="50" charset="0"/>
+              </a:rPr>
+              <a:t>VISÃO DE SOFTWARE - COMPONENTES</a:t>
+            </a:r>
+          </a:p>
+          <a:p>
+            <a:pPr algn="ctr"/>
+            <a:r>
+              <a:rPr lang="pt-BR" sz="1800" b="1">
+                <a:solidFill>
+                  <a:srgbClr val="272A30"/>
+                </a:solidFill>
+                <a:latin typeface="Exo 2" panose="00000500000000000000" pitchFamily="50" charset="0"/>
+              </a:rPr>
+              <a:t> (</a:t>
+            </a:r>
+            <a:r>
+              <a:rPr lang="pt-BR" sz="1800" b="1" err="1">
+                <a:solidFill>
+                  <a:srgbClr val="272A30"/>
+                </a:solidFill>
+                <a:latin typeface="Exo 2" panose="00000500000000000000" pitchFamily="50" charset="0"/>
+              </a:rPr>
+              <a:t>Devs</a:t>
+            </a:r>
+            <a:r>
+              <a:rPr lang="pt-BR" sz="1800" b="1">
+                <a:solidFill>
+                  <a:srgbClr val="272A30"/>
+                </a:solidFill>
+                <a:latin typeface="Exo 2" panose="00000500000000000000" pitchFamily="50" charset="0"/>
+              </a:rPr>
+              <a:t>)</a:t>
+            </a:r>
+          </a:p>
+        </p:txBody>
+      </p:sp>
+      <p:sp>
+        <p:nvSpPr>
+          <p:cNvPr id="145" name="Retângulo 20">
+            <a:extLst>
+              <a:ext uri="{FF2B5EF4-FFF2-40B4-BE49-F238E27FC236}">
+                <a16:creationId xmlns:a16="http://schemas.microsoft.com/office/drawing/2014/main" id="{8E9C2902-395C-4308-92C8-F0BDFE37BA04}"/>
+              </a:ext>
+            </a:extLst>
+          </p:cNvPr>
+          <p:cNvSpPr/>
+          <p:nvPr/>
+        </p:nvSpPr>
+        <p:spPr>
+          <a:xfrm>
+            <a:off x="6797796" y="1351407"/>
+            <a:ext cx="2240677" cy="400110"/>
+          </a:xfrm>
+          <a:prstGeom prst="rect">
+            <a:avLst/>
+          </a:prstGeom>
+        </p:spPr>
+        <p:txBody>
+          <a:bodyPr wrap="square">
+            <a:spAutoFit/>
+          </a:bodyPr>
+          <a:lstStyle/>
+          <a:p>
+            <a:pPr lvl="0">
+              <a:defRPr/>
+            </a:pPr>
+            <a:r>
+              <a:rPr lang="pt-BR" sz="2000" b="1"/>
+              <a:t>Micro </a:t>
+            </a:r>
+            <a:r>
+              <a:rPr lang="pt-BR" sz="2000" b="1" err="1"/>
+              <a:t>service</a:t>
+            </a:r>
+            <a:endParaRPr lang="pt-BR" sz="1600"/>
+          </a:p>
+        </p:txBody>
+      </p:sp>
+      <p:grpSp>
+        <p:nvGrpSpPr>
+          <p:cNvPr id="63" name="Group 38">
+            <a:extLst>
+              <a:ext uri="{FF2B5EF4-FFF2-40B4-BE49-F238E27FC236}">
+                <a16:creationId xmlns:a16="http://schemas.microsoft.com/office/drawing/2014/main" id="{F6D7B49A-964B-4BB8-A96E-C48D24BF21E8}"/>
+              </a:ext>
+            </a:extLst>
+          </p:cNvPr>
+          <p:cNvGrpSpPr/>
+          <p:nvPr/>
+        </p:nvGrpSpPr>
+        <p:grpSpPr>
+          <a:xfrm>
+            <a:off x="10973395" y="3145462"/>
+            <a:ext cx="2101050" cy="1737035"/>
+            <a:chOff x="8835348" y="1524475"/>
+            <a:chExt cx="2566458" cy="2016224"/>
+          </a:xfrm>
+        </p:grpSpPr>
+        <p:sp>
+          <p:nvSpPr>
+            <p:cNvPr id="64" name="Retângulo 63">
+              <a:extLst>
+                <a:ext uri="{FF2B5EF4-FFF2-40B4-BE49-F238E27FC236}">
+                  <a16:creationId xmlns:a16="http://schemas.microsoft.com/office/drawing/2014/main" id="{5BAE88F7-C25B-4EB2-BF6D-92764F1C00A5}"/>
+                </a:ext>
+              </a:extLst>
+            </p:cNvPr>
+            <p:cNvSpPr/>
+            <p:nvPr/>
+          </p:nvSpPr>
+          <p:spPr>
+            <a:xfrm>
+              <a:off x="8902687" y="1524475"/>
+              <a:ext cx="2376264" cy="2016224"/>
+            </a:xfrm>
+            <a:prstGeom prst="rect">
+              <a:avLst/>
+            </a:prstGeom>
+            <a:ln/>
+          </p:spPr>
+          <p:style>
+            <a:lnRef idx="2">
+              <a:schemeClr val="accent5">
+                <a:shade val="50000"/>
+              </a:schemeClr>
+            </a:lnRef>
+            <a:fillRef idx="1">
+              <a:schemeClr val="accent5"/>
+            </a:fillRef>
+            <a:effectRef idx="0">
+              <a:schemeClr val="accent5"/>
+            </a:effectRef>
+            <a:fontRef idx="minor">
+              <a:schemeClr val="lt1"/>
+            </a:fontRef>
+          </p:style>
+          <p:txBody>
+            <a:bodyPr rtlCol="0" anchor="ctr"/>
+            <a:lstStyle/>
+            <a:p>
+              <a:pPr algn="ctr"/>
+              <a:endParaRPr lang="pt-BR" sz="1600">
+                <a:solidFill>
+                  <a:prstClr val="white"/>
+                </a:solidFill>
+                <a:latin typeface="Calibri"/>
+              </a:endParaRPr>
+            </a:p>
+          </p:txBody>
+        </p:sp>
+        <p:sp>
+          <p:nvSpPr>
+            <p:cNvPr id="65" name="Retângulo 64">
+              <a:extLst>
+                <a:ext uri="{FF2B5EF4-FFF2-40B4-BE49-F238E27FC236}">
+                  <a16:creationId xmlns:a16="http://schemas.microsoft.com/office/drawing/2014/main" id="{20FB0413-94DF-417C-BF4E-1C1E955BB00F}"/>
+                </a:ext>
+              </a:extLst>
+            </p:cNvPr>
+            <p:cNvSpPr/>
+            <p:nvPr/>
+          </p:nvSpPr>
+          <p:spPr>
+            <a:xfrm>
+              <a:off x="8835348" y="1583056"/>
+              <a:ext cx="2566458" cy="1120431"/>
+            </a:xfrm>
+            <a:prstGeom prst="rect">
+              <a:avLst/>
+            </a:prstGeom>
+          </p:spPr>
+          <p:txBody>
+            <a:bodyPr wrap="square">
+              <a:spAutoFit/>
+            </a:bodyPr>
+            <a:lstStyle/>
+            <a:p>
+              <a:pPr lvl="0" algn="ctr">
+                <a:defRPr/>
+              </a:pPr>
+              <a:r>
+                <a:rPr lang="pt-BR" sz="1800" b="1" dirty="0">
+                  <a:solidFill>
+                    <a:prstClr val="white"/>
+                  </a:solidFill>
+                </a:rPr>
+                <a:t>Oficina </a:t>
+              </a:r>
+              <a:r>
+                <a:rPr lang="pt-BR" sz="1800" b="1" dirty="0" err="1">
+                  <a:solidFill>
+                    <a:prstClr val="white"/>
+                  </a:solidFill>
+                </a:rPr>
+                <a:t>Controller</a:t>
+              </a:r>
+              <a:endParaRPr lang="pt-BR" sz="1800" b="1" dirty="0">
+                <a:solidFill>
+                  <a:prstClr val="white"/>
+                </a:solidFill>
+              </a:endParaRPr>
+            </a:p>
+            <a:p>
+              <a:pPr lvl="0" algn="ctr">
+                <a:defRPr/>
+              </a:pPr>
+              <a:r>
+                <a:rPr lang="pt-BR" sz="1400" dirty="0">
+                  <a:solidFill>
+                    <a:prstClr val="white"/>
+                  </a:solidFill>
+                </a:rPr>
+                <a:t>[</a:t>
+              </a:r>
+              <a:r>
+                <a:rPr lang="pt-BR" sz="1400" dirty="0" err="1">
+                  <a:solidFill>
+                    <a:prstClr val="white"/>
+                  </a:solidFill>
+                </a:rPr>
+                <a:t>Component</a:t>
+              </a:r>
+              <a:r>
+                <a:rPr lang="pt-BR" sz="1400" dirty="0">
+                  <a:solidFill>
+                    <a:prstClr val="white"/>
+                  </a:solidFill>
+                </a:rPr>
+                <a:t>: Spring MVC </a:t>
+              </a:r>
+              <a:r>
+                <a:rPr lang="pt-BR" sz="1400" dirty="0" err="1">
+                  <a:solidFill>
+                    <a:prstClr val="white"/>
+                  </a:solidFill>
+                </a:rPr>
+                <a:t>Rest</a:t>
+              </a:r>
+              <a:r>
+                <a:rPr lang="pt-BR" sz="1400" dirty="0">
+                  <a:solidFill>
+                    <a:prstClr val="white"/>
+                  </a:solidFill>
+                </a:rPr>
+                <a:t> </a:t>
+              </a:r>
+              <a:r>
+                <a:rPr lang="pt-BR" sz="1400" dirty="0" err="1">
+                  <a:solidFill>
+                    <a:prstClr val="white"/>
+                  </a:solidFill>
+                </a:rPr>
+                <a:t>Controller</a:t>
+              </a:r>
+              <a:r>
+                <a:rPr lang="pt-BR" sz="1400" dirty="0">
+                  <a:solidFill>
+                    <a:prstClr val="white"/>
+                  </a:solidFill>
+                </a:rPr>
+                <a:t>]</a:t>
+              </a:r>
+            </a:p>
+          </p:txBody>
+        </p:sp>
+        <p:sp>
+          <p:nvSpPr>
+            <p:cNvPr id="66" name="Retângulo 20">
+              <a:extLst>
+                <a:ext uri="{FF2B5EF4-FFF2-40B4-BE49-F238E27FC236}">
+                  <a16:creationId xmlns:a16="http://schemas.microsoft.com/office/drawing/2014/main" id="{286825B4-D917-4CB8-985B-88CEE27AC3CB}"/>
+                </a:ext>
+              </a:extLst>
+            </p:cNvPr>
+            <p:cNvSpPr/>
+            <p:nvPr/>
+          </p:nvSpPr>
+          <p:spPr>
+            <a:xfrm>
+              <a:off x="8897495" y="2527921"/>
+              <a:ext cx="2381455" cy="607316"/>
+            </a:xfrm>
+            <a:prstGeom prst="rect">
+              <a:avLst/>
+            </a:prstGeom>
+          </p:spPr>
+          <p:txBody>
+            <a:bodyPr wrap="square">
+              <a:spAutoFit/>
+            </a:bodyPr>
+            <a:lstStyle/>
+            <a:p>
+              <a:pPr lvl="0" algn="ctr">
+                <a:defRPr/>
+              </a:pPr>
+              <a:r>
+                <a:rPr lang="pt-BR" sz="1400" dirty="0">
+                  <a:solidFill>
+                    <a:prstClr val="white"/>
+                  </a:solidFill>
+                </a:rPr>
+                <a:t>Atualiza os dados cadastrados do cliente</a:t>
+              </a:r>
+              <a:endParaRPr lang="pt-BR" sz="1100" dirty="0">
+                <a:solidFill>
+                  <a:prstClr val="white"/>
+                </a:solidFill>
+              </a:endParaRPr>
+            </a:p>
+          </p:txBody>
+        </p:sp>
+      </p:grpSp>
+      <p:cxnSp>
+        <p:nvCxnSpPr>
+          <p:cNvPr id="70" name="Conector de Seta Reta 107">
+            <a:extLst>
+              <a:ext uri="{FF2B5EF4-FFF2-40B4-BE49-F238E27FC236}">
+                <a16:creationId xmlns:a16="http://schemas.microsoft.com/office/drawing/2014/main" id="{B40FBA48-8E02-4AFA-BE2C-5DAB36A5701E}"/>
+              </a:ext>
+            </a:extLst>
+          </p:cNvPr>
+          <p:cNvCxnSpPr>
+            <a:cxnSpLocks/>
+            <a:stCxn id="64" idx="0"/>
+            <a:endCxn id="58" idx="3"/>
+          </p:cNvCxnSpPr>
+          <p:nvPr/>
+        </p:nvCxnSpPr>
+        <p:spPr>
+          <a:xfrm flipH="1" flipV="1">
+            <a:off x="5981893" y="2136352"/>
+            <a:ext cx="6019303" cy="1009110"/>
+          </a:xfrm>
+          <a:prstGeom prst="straightConnector1">
+            <a:avLst/>
+          </a:prstGeom>
+          <a:ln w="19050">
+            <a:solidFill>
+              <a:schemeClr val="accent5">
+                <a:lumMod val="75000"/>
+              </a:schemeClr>
+            </a:solidFill>
+            <a:prstDash val="sysDash"/>
+            <a:headEnd type="none" w="lg" len="lg"/>
+            <a:tailEnd type="triangle" w="lg" len="lg"/>
+          </a:ln>
+        </p:spPr>
+        <p:style>
+          <a:lnRef idx="1">
+            <a:schemeClr val="accent1"/>
+          </a:lnRef>
+          <a:fillRef idx="0">
+            <a:schemeClr val="accent1"/>
+          </a:fillRef>
+          <a:effectRef idx="0">
+            <a:schemeClr val="accent1"/>
+          </a:effectRef>
+          <a:fontRef idx="minor">
+            <a:schemeClr val="tx1"/>
+          </a:fontRef>
+        </p:style>
+      </p:cxnSp>
+      <p:cxnSp>
+        <p:nvCxnSpPr>
+          <p:cNvPr id="71" name="Conector de Seta Reta 107">
+            <a:extLst>
+              <a:ext uri="{FF2B5EF4-FFF2-40B4-BE49-F238E27FC236}">
+                <a16:creationId xmlns:a16="http://schemas.microsoft.com/office/drawing/2014/main" id="{F185D62E-BC70-4973-A154-F92F8272F0E9}"/>
+              </a:ext>
+            </a:extLst>
+          </p:cNvPr>
+          <p:cNvCxnSpPr>
+            <a:cxnSpLocks/>
+            <a:stCxn id="76" idx="1"/>
+            <a:endCxn id="62" idx="3"/>
+          </p:cNvCxnSpPr>
+          <p:nvPr/>
+        </p:nvCxnSpPr>
+        <p:spPr>
+          <a:xfrm flipH="1" flipV="1">
+            <a:off x="5977143" y="1703210"/>
+            <a:ext cx="4706755" cy="55022"/>
+          </a:xfrm>
+          <a:prstGeom prst="straightConnector1">
+            <a:avLst/>
+          </a:prstGeom>
+          <a:ln w="19050">
+            <a:solidFill>
+              <a:schemeClr val="accent5">
+                <a:lumMod val="75000"/>
+              </a:schemeClr>
+            </a:solidFill>
+            <a:prstDash val="sysDash"/>
+            <a:headEnd type="none" w="lg" len="lg"/>
+            <a:tailEnd type="triangle" w="lg" len="lg"/>
+          </a:ln>
+        </p:spPr>
+        <p:style>
+          <a:lnRef idx="1">
+            <a:schemeClr val="accent1"/>
+          </a:lnRef>
+          <a:fillRef idx="0">
+            <a:schemeClr val="accent1"/>
+          </a:fillRef>
+          <a:effectRef idx="0">
+            <a:schemeClr val="accent1"/>
+          </a:effectRef>
+          <a:fontRef idx="minor">
+            <a:schemeClr val="tx1"/>
+          </a:fontRef>
+        </p:style>
+      </p:cxnSp>
+    </p:spTree>
+    <p:extLst>
+      <p:ext uri="{BB962C8B-B14F-4D97-AF65-F5344CB8AC3E}">
+        <p14:creationId xmlns:p14="http://schemas.microsoft.com/office/powerpoint/2010/main" val="3244439550"/>
+      </p:ext>
+    </p:extLst>
+  </p:cSld>
+  <p:clrMapOvr>
+    <a:masterClrMapping/>
+  </p:clrMapOvr>
+  <p:timing>
+    <p:tnLst>
+      <p:par>
+        <p:cTn id="1" dur="indefinite" restart="never" nodeType="tmRoot">
+          <p:childTnLst>
+            <p:seq concurrent="1" nextAc="seek">
+              <p:cTn id="2" dur="indefinite" nodeType="mainSeq">
+                <p:childTnLst>
+                  <p:par>
+                    <p:cTn id="3" fill="hold">
+                      <p:stCondLst>
+                        <p:cond delay="indefinite"/>
+                      </p:stCondLst>
+                      <p:childTnLst>
+                        <p:par>
+                          <p:cTn id="4" fill="hold">
+                            <p:stCondLst>
+                              <p:cond delay="0"/>
+                            </p:stCondLst>
+                            <p:childTnLst>
+                              <p:par>
+                                <p:cTn id="5" presetID="1" presetClass="entr" presetSubtype="0" fill="hold" nodeType="clickEffect">
+                                  <p:stCondLst>
+                                    <p:cond delay="0"/>
+                                  </p:stCondLst>
+                                  <p:childTnLst>
+                                    <p:set>
+                                      <p:cBhvr>
+                                        <p:cTn id="6" dur="1" fill="hold">
+                                          <p:stCondLst>
+                                            <p:cond delay="0"/>
+                                          </p:stCondLst>
+                                        </p:cTn>
+                                        <p:tgtEl>
+                                          <p:spTgt spid="118"/>
+                                        </p:tgtEl>
+                                        <p:attrNameLst>
+                                          <p:attrName>style.visibility</p:attrName>
+                                        </p:attrNameLst>
+                                      </p:cBhvr>
+                                      <p:to>
+                                        <p:strVal val="visible"/>
+                                      </p:to>
+                                    </p:set>
+                                  </p:childTnLst>
+                                </p:cTn>
+                              </p:par>
+                              <p:par>
+                                <p:cTn id="7" presetID="1" presetClass="entr" presetSubtype="0" fill="hold" nodeType="withEffect">
+                                  <p:stCondLst>
+                                    <p:cond delay="0"/>
+                                  </p:stCondLst>
+                                  <p:childTnLst>
+                                    <p:set>
+                                      <p:cBhvr>
+                                        <p:cTn id="8" dur="1" fill="hold">
+                                          <p:stCondLst>
+                                            <p:cond delay="0"/>
+                                          </p:stCondLst>
+                                        </p:cTn>
+                                        <p:tgtEl>
+                                          <p:spTgt spid="131"/>
+                                        </p:tgtEl>
+                                        <p:attrNameLst>
+                                          <p:attrName>style.visibility</p:attrName>
+                                        </p:attrNameLst>
+                                      </p:cBhvr>
+                                      <p:to>
+                                        <p:strVal val="visible"/>
+                                      </p:to>
+                                    </p:set>
+                                  </p:childTnLst>
+                                </p:cTn>
+                              </p:par>
+                              <p:par>
+                                <p:cTn id="9" presetID="1" presetClass="entr" presetSubtype="0" fill="hold" nodeType="withEffect">
+                                  <p:stCondLst>
+                                    <p:cond delay="0"/>
+                                  </p:stCondLst>
+                                  <p:childTnLst>
+                                    <p:set>
+                                      <p:cBhvr>
+                                        <p:cTn id="10" dur="1" fill="hold">
+                                          <p:stCondLst>
+                                            <p:cond delay="0"/>
+                                          </p:stCondLst>
+                                        </p:cTn>
+                                        <p:tgtEl>
+                                          <p:spTgt spid="143"/>
+                                        </p:tgtEl>
+                                        <p:attrNameLst>
+                                          <p:attrName>style.visibility</p:attrName>
+                                        </p:attrNameLst>
+                                      </p:cBhvr>
+                                      <p:to>
+                                        <p:strVal val="visible"/>
+                                      </p:to>
+                                    </p:set>
+                                  </p:childTnLst>
+                                </p:cTn>
+                              </p:par>
+                              <p:par>
+                                <p:cTn id="11" presetID="1" presetClass="entr" presetSubtype="0" fill="hold" grpId="0" nodeType="withEffect">
+                                  <p:stCondLst>
+                                    <p:cond delay="0"/>
+                                  </p:stCondLst>
+                                  <p:childTnLst>
+                                    <p:set>
+                                      <p:cBhvr>
+                                        <p:cTn id="12" dur="1" fill="hold">
+                                          <p:stCondLst>
+                                            <p:cond delay="0"/>
+                                          </p:stCondLst>
+                                        </p:cTn>
+                                        <p:tgtEl>
+                                          <p:spTgt spid="133"/>
+                                        </p:tgtEl>
+                                        <p:attrNameLst>
+                                          <p:attrName>style.visibility</p:attrName>
+                                        </p:attrNameLst>
+                                      </p:cBhvr>
+                                      <p:to>
+                                        <p:strVal val="visible"/>
+                                      </p:to>
+                                    </p:set>
+                                  </p:childTnLst>
+                                </p:cTn>
+                              </p:par>
+                              <p:par>
+                                <p:cTn id="13" presetID="1" presetClass="entr" presetSubtype="0" fill="hold" nodeType="withEffect">
+                                  <p:stCondLst>
+                                    <p:cond delay="0"/>
+                                  </p:stCondLst>
+                                  <p:childTnLst>
+                                    <p:set>
+                                      <p:cBhvr>
+                                        <p:cTn id="14" dur="1" fill="hold">
+                                          <p:stCondLst>
+                                            <p:cond delay="0"/>
+                                          </p:stCondLst>
+                                        </p:cTn>
+                                        <p:tgtEl>
+                                          <p:spTgt spid="68"/>
+                                        </p:tgtEl>
+                                        <p:attrNameLst>
+                                          <p:attrName>style.visibility</p:attrName>
+                                        </p:attrNameLst>
+                                      </p:cBhvr>
+                                      <p:to>
+                                        <p:strVal val="visible"/>
+                                      </p:to>
+                                    </p:set>
+                                  </p:childTnLst>
+                                </p:cTn>
+                              </p:par>
+                            </p:childTnLst>
+                          </p:cTn>
+                        </p:par>
+                      </p:childTnLst>
+                    </p:cTn>
+                  </p:par>
+                  <p:par>
+                    <p:cTn id="15" fill="hold">
+                      <p:stCondLst>
+                        <p:cond delay="indefinite"/>
+                      </p:stCondLst>
+                      <p:childTnLst>
+                        <p:par>
+                          <p:cTn id="16" fill="hold">
+                            <p:stCondLst>
+                              <p:cond delay="0"/>
+                            </p:stCondLst>
+                            <p:childTnLst>
+                              <p:par>
+                                <p:cTn id="17" presetID="1" presetClass="entr" presetSubtype="0" fill="hold" nodeType="clickEffect">
+                                  <p:stCondLst>
+                                    <p:cond delay="0"/>
+                                  </p:stCondLst>
+                                  <p:childTnLst>
+                                    <p:set>
+                                      <p:cBhvr>
+                                        <p:cTn id="18" dur="1" fill="hold">
+                                          <p:stCondLst>
+                                            <p:cond delay="0"/>
+                                          </p:stCondLst>
+                                        </p:cTn>
+                                        <p:tgtEl>
+                                          <p:spTgt spid="83"/>
+                                        </p:tgtEl>
+                                        <p:attrNameLst>
+                                          <p:attrName>style.visibility</p:attrName>
+                                        </p:attrNameLst>
+                                      </p:cBhvr>
+                                      <p:to>
+                                        <p:strVal val="visible"/>
+                                      </p:to>
+                                    </p:set>
+                                  </p:childTnLst>
+                                </p:cTn>
+                              </p:par>
+                              <p:par>
+                                <p:cTn id="19" presetID="1" presetClass="entr" presetSubtype="0" fill="hold" nodeType="withEffect">
+                                  <p:stCondLst>
+                                    <p:cond delay="0"/>
+                                  </p:stCondLst>
+                                  <p:childTnLst>
+                                    <p:set>
+                                      <p:cBhvr>
+                                        <p:cTn id="20" dur="1" fill="hold">
+                                          <p:stCondLst>
+                                            <p:cond delay="0"/>
+                                          </p:stCondLst>
+                                        </p:cTn>
+                                        <p:tgtEl>
+                                          <p:spTgt spid="130"/>
+                                        </p:tgtEl>
+                                        <p:attrNameLst>
+                                          <p:attrName>style.visibility</p:attrName>
+                                        </p:attrNameLst>
+                                      </p:cBhvr>
+                                      <p:to>
+                                        <p:strVal val="visible"/>
+                                      </p:to>
+                                    </p:set>
+                                  </p:childTnLst>
+                                </p:cTn>
+                              </p:par>
+                            </p:childTnLst>
+                          </p:cTn>
+                        </p:par>
+                      </p:childTnLst>
+                    </p:cTn>
+                  </p:par>
+                  <p:par>
+                    <p:cTn id="21" fill="hold">
+                      <p:stCondLst>
+                        <p:cond delay="indefinite"/>
+                      </p:stCondLst>
+                      <p:childTnLst>
+                        <p:par>
+                          <p:cTn id="22" fill="hold">
+                            <p:stCondLst>
+                              <p:cond delay="0"/>
+                            </p:stCondLst>
+                            <p:childTnLst>
+                              <p:par>
+                                <p:cTn id="23" presetID="1" presetClass="entr" presetSubtype="0" fill="hold" nodeType="clickEffect">
+                                  <p:stCondLst>
+                                    <p:cond delay="0"/>
+                                  </p:stCondLst>
+                                  <p:childTnLst>
+                                    <p:set>
+                                      <p:cBhvr>
+                                        <p:cTn id="24" dur="1" fill="hold">
+                                          <p:stCondLst>
+                                            <p:cond delay="0"/>
+                                          </p:stCondLst>
+                                        </p:cTn>
+                                        <p:tgtEl>
+                                          <p:spTgt spid="127"/>
+                                        </p:tgtEl>
+                                        <p:attrNameLst>
+                                          <p:attrName>style.visibility</p:attrName>
+                                        </p:attrNameLst>
+                                      </p:cBhvr>
+                                      <p:to>
+                                        <p:strVal val="visible"/>
+                                      </p:to>
+                                    </p:set>
+                                  </p:childTnLst>
+                                </p:cTn>
+                              </p:par>
+                              <p:par>
+                                <p:cTn id="25" presetID="1" presetClass="entr" presetSubtype="0" fill="hold" nodeType="withEffect">
+                                  <p:stCondLst>
+                                    <p:cond delay="0"/>
+                                  </p:stCondLst>
+                                  <p:childTnLst>
+                                    <p:set>
+                                      <p:cBhvr>
+                                        <p:cTn id="26" dur="1" fill="hold">
+                                          <p:stCondLst>
+                                            <p:cond delay="0"/>
+                                          </p:stCondLst>
+                                        </p:cTn>
+                                        <p:tgtEl>
+                                          <p:spTgt spid="57"/>
+                                        </p:tgtEl>
+                                        <p:attrNameLst>
+                                          <p:attrName>style.visibility</p:attrName>
+                                        </p:attrNameLst>
+                                      </p:cBhvr>
+                                      <p:to>
+                                        <p:strVal val="visible"/>
+                                      </p:to>
+                                    </p:set>
+                                  </p:childTnLst>
+                                </p:cTn>
+                              </p:par>
+                            </p:childTnLst>
+                          </p:cTn>
+                        </p:par>
+                      </p:childTnLst>
+                    </p:cTn>
+                  </p:par>
+                  <p:par>
+                    <p:cTn id="27" fill="hold">
+                      <p:stCondLst>
+                        <p:cond delay="indefinite"/>
+                      </p:stCondLst>
+                      <p:childTnLst>
+                        <p:par>
+                          <p:cTn id="28" fill="hold">
+                            <p:stCondLst>
+                              <p:cond delay="0"/>
+                            </p:stCondLst>
+                            <p:childTnLst>
+                              <p:par>
+                                <p:cTn id="29" presetID="1" presetClass="entr" presetSubtype="0" fill="hold" nodeType="clickEffect">
+                                  <p:stCondLst>
+                                    <p:cond delay="0"/>
+                                  </p:stCondLst>
+                                  <p:childTnLst>
+                                    <p:set>
+                                      <p:cBhvr>
+                                        <p:cTn id="30" dur="1" fill="hold">
+                                          <p:stCondLst>
+                                            <p:cond delay="0"/>
+                                          </p:stCondLst>
+                                        </p:cTn>
+                                        <p:tgtEl>
+                                          <p:spTgt spid="89"/>
+                                        </p:tgtEl>
+                                        <p:attrNameLst>
+                                          <p:attrName>style.visibility</p:attrName>
+                                        </p:attrNameLst>
+                                      </p:cBhvr>
+                                      <p:to>
+                                        <p:strVal val="visible"/>
+                                      </p:to>
+                                    </p:set>
+                                  </p:childTnLst>
+                                </p:cTn>
+                              </p:par>
+                              <p:par>
+                                <p:cTn id="31" presetID="1" presetClass="entr" presetSubtype="0" fill="hold" nodeType="withEffect">
+                                  <p:stCondLst>
+                                    <p:cond delay="0"/>
+                                  </p:stCondLst>
+                                  <p:childTnLst>
+                                    <p:set>
+                                      <p:cBhvr>
+                                        <p:cTn id="32" dur="1" fill="hold">
+                                          <p:stCondLst>
+                                            <p:cond delay="0"/>
+                                          </p:stCondLst>
+                                        </p:cTn>
+                                        <p:tgtEl>
+                                          <p:spTgt spid="126"/>
+                                        </p:tgtEl>
+                                        <p:attrNameLst>
+                                          <p:attrName>style.visibility</p:attrName>
+                                        </p:attrNameLst>
+                                      </p:cBhvr>
+                                      <p:to>
+                                        <p:strVal val="visible"/>
+                                      </p:to>
+                                    </p:set>
+                                  </p:childTnLst>
+                                </p:cTn>
+                              </p:par>
+                              <p:par>
+                                <p:cTn id="33" presetID="1" presetClass="entr" presetSubtype="0" fill="hold" nodeType="withEffect">
+                                  <p:stCondLst>
+                                    <p:cond delay="0"/>
+                                  </p:stCondLst>
+                                  <p:childTnLst>
+                                    <p:set>
+                                      <p:cBhvr>
+                                        <p:cTn id="34" dur="1" fill="hold">
+                                          <p:stCondLst>
+                                            <p:cond delay="0"/>
+                                          </p:stCondLst>
+                                        </p:cTn>
+                                        <p:tgtEl>
+                                          <p:spTgt spid="129"/>
+                                        </p:tgtEl>
+                                        <p:attrNameLst>
+                                          <p:attrName>style.visibility</p:attrName>
+                                        </p:attrNameLst>
+                                      </p:cBhvr>
+                                      <p:to>
+                                        <p:strVal val="visible"/>
+                                      </p:to>
+                                    </p:set>
+                                  </p:childTnLst>
+                                </p:cTn>
+                              </p:par>
+                              <p:par>
+                                <p:cTn id="35" presetID="1" presetClass="entr" presetSubtype="0" fill="hold" nodeType="withEffect">
+                                  <p:stCondLst>
+                                    <p:cond delay="0"/>
+                                  </p:stCondLst>
+                                  <p:childTnLst>
+                                    <p:set>
+                                      <p:cBhvr>
+                                        <p:cTn id="36" dur="1" fill="hold">
+                                          <p:stCondLst>
+                                            <p:cond delay="0"/>
+                                          </p:stCondLst>
+                                        </p:cTn>
+                                        <p:tgtEl>
+                                          <p:spTgt spid="132"/>
+                                        </p:tgtEl>
+                                        <p:attrNameLst>
+                                          <p:attrName>style.visibility</p:attrName>
+                                        </p:attrNameLst>
+                                      </p:cBhvr>
+                                      <p:to>
+                                        <p:strVal val="visible"/>
+                                      </p:to>
+                                    </p:set>
+                                  </p:childTnLst>
+                                </p:cTn>
+                              </p:par>
+                            </p:childTnLst>
+                          </p:cTn>
+                        </p:par>
+                      </p:childTnLst>
+                    </p:cTn>
+                  </p:par>
+                  <p:par>
+                    <p:cTn id="37" fill="hold">
+                      <p:stCondLst>
+                        <p:cond delay="indefinite"/>
+                      </p:stCondLst>
+                      <p:childTnLst>
+                        <p:par>
+                          <p:cTn id="38" fill="hold">
+                            <p:stCondLst>
+                              <p:cond delay="0"/>
+                            </p:stCondLst>
+                            <p:childTnLst>
+                              <p:par>
+                                <p:cTn id="39" presetID="1" presetClass="entr" presetSubtype="0" fill="hold" nodeType="clickEffect">
+                                  <p:stCondLst>
+                                    <p:cond delay="0"/>
+                                  </p:stCondLst>
+                                  <p:childTnLst>
+                                    <p:set>
+                                      <p:cBhvr>
+                                        <p:cTn id="40" dur="1" fill="hold">
+                                          <p:stCondLst>
+                                            <p:cond delay="0"/>
+                                          </p:stCondLst>
+                                        </p:cTn>
+                                        <p:tgtEl>
+                                          <p:spTgt spid="85"/>
+                                        </p:tgtEl>
+                                        <p:attrNameLst>
+                                          <p:attrName>style.visibility</p:attrName>
+                                        </p:attrNameLst>
+                                      </p:cBhvr>
+                                      <p:to>
+                                        <p:strVal val="visible"/>
+                                      </p:to>
+                                    </p:set>
+                                  </p:childTnLst>
+                                </p:cTn>
+                              </p:par>
+                            </p:childTnLst>
+                          </p:cTn>
+                        </p:par>
+                      </p:childTnLst>
+                    </p:cTn>
+                  </p:par>
+                  <p:par>
+                    <p:cTn id="41" fill="hold">
+                      <p:stCondLst>
+                        <p:cond delay="indefinite"/>
+                      </p:stCondLst>
+                      <p:childTnLst>
+                        <p:par>
+                          <p:cTn id="42" fill="hold">
+                            <p:stCondLst>
+                              <p:cond delay="0"/>
+                            </p:stCondLst>
+                            <p:childTnLst>
+                              <p:par>
+                                <p:cTn id="43" presetID="1" presetClass="entr" presetSubtype="0" fill="hold" nodeType="clickEffect">
+                                  <p:stCondLst>
+                                    <p:cond delay="0"/>
+                                  </p:stCondLst>
+                                  <p:childTnLst>
+                                    <p:set>
+                                      <p:cBhvr>
+                                        <p:cTn id="44" dur="1" fill="hold">
+                                          <p:stCondLst>
+                                            <p:cond delay="0"/>
+                                          </p:stCondLst>
+                                        </p:cTn>
+                                        <p:tgtEl>
+                                          <p:spTgt spid="108"/>
+                                        </p:tgtEl>
+                                        <p:attrNameLst>
+                                          <p:attrName>style.visibility</p:attrName>
+                                        </p:attrNameLst>
+                                      </p:cBhvr>
+                                      <p:to>
+                                        <p:strVal val="visible"/>
+                                      </p:to>
+                                    </p:set>
+                                  </p:childTnLst>
+                                </p:cTn>
+                              </p:par>
+                            </p:childTnLst>
+                          </p:cTn>
+                        </p:par>
+                      </p:childTnLst>
+                    </p:cTn>
+                  </p:par>
+                  <p:par>
+                    <p:cTn id="45" fill="hold">
+                      <p:stCondLst>
+                        <p:cond delay="indefinite"/>
+                      </p:stCondLst>
+                      <p:childTnLst>
+                        <p:par>
+                          <p:cTn id="46" fill="hold">
+                            <p:stCondLst>
+                              <p:cond delay="0"/>
+                            </p:stCondLst>
+                            <p:childTnLst>
+                              <p:par>
+                                <p:cTn id="47" presetID="1" presetClass="entr" presetSubtype="0" fill="hold" nodeType="clickEffect">
+                                  <p:stCondLst>
+                                    <p:cond delay="0"/>
+                                  </p:stCondLst>
+                                  <p:childTnLst>
+                                    <p:set>
+                                      <p:cBhvr>
+                                        <p:cTn id="48" dur="1" fill="hold">
+                                          <p:stCondLst>
+                                            <p:cond delay="0"/>
+                                          </p:stCondLst>
+                                        </p:cTn>
+                                        <p:tgtEl>
+                                          <p:spTgt spid="63"/>
+                                        </p:tgtEl>
+                                        <p:attrNameLst>
+                                          <p:attrName>style.visibility</p:attrName>
+                                        </p:attrNameLst>
+                                      </p:cBhvr>
+                                      <p:to>
+                                        <p:strVal val="visible"/>
+                                      </p:to>
+                                    </p:set>
+                                  </p:childTnLst>
+                                </p:cTn>
+                              </p:par>
+                            </p:childTnLst>
+                          </p:cTn>
+                        </p:par>
+                      </p:childTnLst>
+                    </p:cTn>
+                  </p:par>
+                  <p:par>
+                    <p:cTn id="49" fill="hold">
+                      <p:stCondLst>
+                        <p:cond delay="indefinite"/>
+                      </p:stCondLst>
+                      <p:childTnLst>
+                        <p:par>
+                          <p:cTn id="50" fill="hold">
+                            <p:stCondLst>
+                              <p:cond delay="0"/>
+                            </p:stCondLst>
+                            <p:childTnLst>
+                              <p:par>
+                                <p:cTn id="51" presetID="1" presetClass="entr" presetSubtype="0" fill="hold" nodeType="clickEffect">
+                                  <p:stCondLst>
+                                    <p:cond delay="0"/>
+                                  </p:stCondLst>
+                                  <p:childTnLst>
+                                    <p:set>
+                                      <p:cBhvr>
+                                        <p:cTn id="52" dur="1" fill="hold">
+                                          <p:stCondLst>
+                                            <p:cond delay="0"/>
+                                          </p:stCondLst>
+                                        </p:cTn>
+                                        <p:tgtEl>
+                                          <p:spTgt spid="70"/>
+                                        </p:tgtEl>
+                                        <p:attrNameLst>
+                                          <p:attrName>style.visibility</p:attrName>
+                                        </p:attrNameLst>
+                                      </p:cBhvr>
+                                      <p:to>
+                                        <p:strVal val="visible"/>
+                                      </p:to>
+                                    </p:set>
+                                  </p:childTnLst>
+                                </p:cTn>
+                              </p:par>
+                            </p:childTnLst>
+                          </p:cTn>
+                        </p:par>
+                      </p:childTnLst>
+                    </p:cTn>
+                  </p:par>
+                  <p:par>
+                    <p:cTn id="53" fill="hold">
+                      <p:stCondLst>
+                        <p:cond delay="indefinite"/>
+                      </p:stCondLst>
+                      <p:childTnLst>
+                        <p:par>
+                          <p:cTn id="54" fill="hold">
+                            <p:stCondLst>
+                              <p:cond delay="0"/>
+                            </p:stCondLst>
+                            <p:childTnLst>
+                              <p:par>
+                                <p:cTn id="55" presetID="1" presetClass="entr" presetSubtype="0" fill="hold" nodeType="clickEffect">
+                                  <p:stCondLst>
+                                    <p:cond delay="0"/>
+                                  </p:stCondLst>
+                                  <p:childTnLst>
+                                    <p:set>
+                                      <p:cBhvr>
+                                        <p:cTn id="56" dur="1" fill="hold">
+                                          <p:stCondLst>
+                                            <p:cond delay="0"/>
+                                          </p:stCondLst>
+                                        </p:cTn>
+                                        <p:tgtEl>
+                                          <p:spTgt spid="71"/>
+                                        </p:tgtEl>
+                                        <p:attrNameLst>
+                                          <p:attrName>style.visibility</p:attrName>
+                                        </p:attrNameLst>
+                                      </p:cBhvr>
+                                      <p:to>
+                                        <p:strVal val="visible"/>
+                                      </p:to>
+                                    </p:set>
+                                  </p:childTnLst>
+                                </p:cTn>
+                              </p:par>
+                            </p:childTnLst>
+                          </p:cTn>
+                        </p:par>
+                      </p:childTnLst>
+                    </p:cTn>
+                  </p:par>
+                </p:childTnLst>
+              </p:cTn>
+              <p:prevCondLst>
+                <p:cond evt="onPrev" delay="0">
+                  <p:tgtEl>
+                    <p:sldTgt/>
+                  </p:tgtEl>
+                </p:cond>
+              </p:prevCondLst>
+              <p:nextCondLst>
+                <p:cond evt="onNext" delay="0">
+                  <p:tgtEl>
+                    <p:sldTgt/>
+                  </p:tgtEl>
+                </p:cond>
+              </p:nextCondLst>
+            </p:seq>
+          </p:childTnLst>
+        </p:cTn>
+      </p:par>
+    </p:tnLst>
+    <p:bldLst>
+      <p:bldP spid="133" grpId="0"/>
     </p:bldLst>
   </p:timing>
 </p:sld>
@@ -10658,12 +14643,9 @@
 </file>
 
 <file path=customXml/item1.xml><?xml version="1.0" encoding="utf-8"?>
-<?mso-contentType ?>
-<FormTemplates xmlns="http://schemas.microsoft.com/sharepoint/v3/contenttype/forms">
-  <Display>DocumentLibraryForm</Display>
-  <Edit>DocumentLibraryForm</Edit>
-  <New>DocumentLibraryForm</New>
-</FormTemplates>
+<p:properties xmlns:p="http://schemas.microsoft.com/office/2006/metadata/properties" xmlns:xsi="http://www.w3.org/2001/XMLSchema-instance" xmlns:pc="http://schemas.microsoft.com/office/infopath/2007/PartnerControls">
+  <documentManagement/>
+</p:properties>
 </file>
 
 <file path=customXml/item2.xml><?xml version="1.0" encoding="utf-8"?>
@@ -10890,15 +14872,27 @@
 </file>
 
 <file path=customXml/item3.xml><?xml version="1.0" encoding="utf-8"?>
-<p:properties xmlns:p="http://schemas.microsoft.com/office/2006/metadata/properties" xmlns:xsi="http://www.w3.org/2001/XMLSchema-instance" xmlns:pc="http://schemas.microsoft.com/office/infopath/2007/PartnerControls">
-  <documentManagement/>
-</p:properties>
+<?mso-contentType ?>
+<FormTemplates xmlns="http://schemas.microsoft.com/sharepoint/v3/contenttype/forms">
+  <Display>DocumentLibraryForm</Display>
+  <Edit>DocumentLibraryForm</Edit>
+  <New>DocumentLibraryForm</New>
+</FormTemplates>
 </file>
 
 <file path=customXml/itemProps1.xml><?xml version="1.0" encoding="utf-8"?>
-<ds:datastoreItem xmlns:ds="http://schemas.openxmlformats.org/officeDocument/2006/customXml" ds:itemID="{B2402960-8EF3-4234-B7C9-25E125FD4CA5}">
+<ds:datastoreItem xmlns:ds="http://schemas.openxmlformats.org/officeDocument/2006/customXml" ds:itemID="{30D3F7B2-E865-49C4-B6C4-1C3489F322E5}">
   <ds:schemaRefs>
-    <ds:schemaRef ds:uri="http://schemas.microsoft.com/sharepoint/v3/contenttype/forms"/>
+    <ds:schemaRef ds:uri="http://purl.org/dc/elements/1.1/"/>
+    <ds:schemaRef ds:uri="http://schemas.microsoft.com/office/2006/metadata/properties"/>
+    <ds:schemaRef ds:uri="4327b14a-fe89-488e-9f6d-9658cacf372b"/>
+    <ds:schemaRef ds:uri="bbcd8c33-6940-4d4c-a587-bbc736ca1e4d"/>
+    <ds:schemaRef ds:uri="http://purl.org/dc/terms/"/>
+    <ds:schemaRef ds:uri="http://schemas.openxmlformats.org/package/2006/metadata/core-properties"/>
+    <ds:schemaRef ds:uri="http://schemas.microsoft.com/office/2006/documentManagement/types"/>
+    <ds:schemaRef ds:uri="http://schemas.microsoft.com/office/infopath/2007/PartnerControls"/>
+    <ds:schemaRef ds:uri="http://www.w3.org/XML/1998/namespace"/>
+    <ds:schemaRef ds:uri="http://purl.org/dc/dcmitype/"/>
   </ds:schemaRefs>
 </ds:datastoreItem>
 </file>
@@ -10923,18 +14917,9 @@
 </file>
 
 <file path=customXml/itemProps3.xml><?xml version="1.0" encoding="utf-8"?>
-<ds:datastoreItem xmlns:ds="http://schemas.openxmlformats.org/officeDocument/2006/customXml" ds:itemID="{30D3F7B2-E865-49C4-B6C4-1C3489F322E5}">
+<ds:datastoreItem xmlns:ds="http://schemas.openxmlformats.org/officeDocument/2006/customXml" ds:itemID="{B2402960-8EF3-4234-B7C9-25E125FD4CA5}">
   <ds:schemaRefs>
-    <ds:schemaRef ds:uri="http://purl.org/dc/elements/1.1/"/>
-    <ds:schemaRef ds:uri="http://schemas.microsoft.com/office/2006/metadata/properties"/>
-    <ds:schemaRef ds:uri="4327b14a-fe89-488e-9f6d-9658cacf372b"/>
-    <ds:schemaRef ds:uri="bbcd8c33-6940-4d4c-a587-bbc736ca1e4d"/>
-    <ds:schemaRef ds:uri="http://purl.org/dc/terms/"/>
-    <ds:schemaRef ds:uri="http://schemas.openxmlformats.org/package/2006/metadata/core-properties"/>
-    <ds:schemaRef ds:uri="http://schemas.microsoft.com/office/2006/documentManagement/types"/>
-    <ds:schemaRef ds:uri="http://schemas.microsoft.com/office/infopath/2007/PartnerControls"/>
-    <ds:schemaRef ds:uri="http://www.w3.org/XML/1998/namespace"/>
-    <ds:schemaRef ds:uri="http://purl.org/dc/dcmitype/"/>
+    <ds:schemaRef ds:uri="http://schemas.microsoft.com/sharepoint/v3/contenttype/forms"/>
   </ds:schemaRefs>
 </ds:datastoreItem>
 </file>
</xml_diff>